<commit_message>
updated scheme rules deck
</commit_message>
<xml_diff>
--- a/presentations/pi_23_oct_2023/presentations/Scheme Rules Presentation.pptx
+++ b/presentations/pi_23_oct_2023/presentations/Scheme Rules Presentation.pptx
@@ -5,19 +5,21 @@
     <p:sldMasterId id="2147483660" r:id="rId4"/>
   </p:sldMasterIdLst>
   <p:notesMasterIdLst>
-    <p:notesMasterId r:id="rId15"/>
+    <p:notesMasterId r:id="rId17"/>
   </p:notesMasterIdLst>
   <p:sldIdLst>
     <p:sldId id="258" r:id="rId5"/>
     <p:sldId id="260" r:id="rId6"/>
-    <p:sldId id="261" r:id="rId7"/>
-    <p:sldId id="262" r:id="rId8"/>
-    <p:sldId id="263" r:id="rId9"/>
-    <p:sldId id="264" r:id="rId10"/>
-    <p:sldId id="268" r:id="rId11"/>
-    <p:sldId id="265" r:id="rId12"/>
-    <p:sldId id="269" r:id="rId13"/>
-    <p:sldId id="270" r:id="rId14"/>
+    <p:sldId id="272" r:id="rId7"/>
+    <p:sldId id="271" r:id="rId8"/>
+    <p:sldId id="261" r:id="rId9"/>
+    <p:sldId id="262" r:id="rId10"/>
+    <p:sldId id="263" r:id="rId11"/>
+    <p:sldId id="264" r:id="rId12"/>
+    <p:sldId id="268" r:id="rId13"/>
+    <p:sldId id="265" r:id="rId14"/>
+    <p:sldId id="269" r:id="rId15"/>
+    <p:sldId id="270" r:id="rId16"/>
   </p:sldIdLst>
   <p:sldSz cx="24387175" cy="13716000"/>
   <p:notesSz cx="6858000" cy="9144000"/>
@@ -206,7 +208,7 @@
           <a:p>
             <a:fld id="{F43C7158-3EDA-D449-8D0F-DA0A67645948}" type="datetimeFigureOut">
               <a:rPr lang="en-US" smtClean="0"/>
-              <a:t>10/29/23</a:t>
+              <a:t>10/31/23</a:t>
             </a:fld>
             <a:endParaRPr lang="en-US"/>
           </a:p>
@@ -3558,6 +3560,1001 @@
           <p:cNvPr id="2" name="Title 1">
             <a:extLst>
               <a:ext uri="{FF2B5EF4-FFF2-40B4-BE49-F238E27FC236}">
+                <a16:creationId xmlns:a16="http://schemas.microsoft.com/office/drawing/2014/main" id="{C826B357-687D-21E7-A1C2-8651CF064282}"/>
+              </a:ext>
+            </a:extLst>
+          </p:cNvPr>
+          <p:cNvSpPr>
+            <a:spLocks noGrp="1"/>
+          </p:cNvSpPr>
+          <p:nvPr>
+            <p:ph type="title"/>
+          </p:nvPr>
+        </p:nvSpPr>
+        <p:spPr/>
+        <p:txBody>
+          <a:bodyPr>
+            <a:noAutofit/>
+          </a:bodyPr>
+          <a:lstStyle/>
+          <a:p>
+            <a:r>
+              <a:rPr lang="en-US" sz="6600" dirty="0"/>
+              <a:t>Let’s Walk Through an Example: Entity Responsibilities </a:t>
+            </a:r>
+          </a:p>
+        </p:txBody>
+      </p:sp>
+      <p:sp>
+        <p:nvSpPr>
+          <p:cNvPr id="3" name="Content Placeholder 2">
+            <a:extLst>
+              <a:ext uri="{FF2B5EF4-FFF2-40B4-BE49-F238E27FC236}">
+                <a16:creationId xmlns:a16="http://schemas.microsoft.com/office/drawing/2014/main" id="{EDD7BD75-478F-9798-388A-51AA2EF89880}"/>
+              </a:ext>
+            </a:extLst>
+          </p:cNvPr>
+          <p:cNvSpPr>
+            <a:spLocks noGrp="1"/>
+          </p:cNvSpPr>
+          <p:nvPr>
+            <p:ph idx="1"/>
+          </p:nvPr>
+        </p:nvSpPr>
+        <p:spPr/>
+        <p:txBody>
+          <a:bodyPr>
+            <a:noAutofit/>
+          </a:bodyPr>
+          <a:lstStyle/>
+          <a:p>
+            <a:pPr marL="0">
+              <a:lnSpc>
+                <a:spcPct val="150000"/>
+              </a:lnSpc>
+              <a:spcBef>
+                <a:spcPts val="0"/>
+              </a:spcBef>
+              <a:buNone/>
+            </a:pPr>
+            <a:r>
+              <a:rPr lang="en-US" sz="2000" b="1" dirty="0">
+                <a:solidFill>
+                  <a:srgbClr val="000000"/>
+                </a:solidFill>
+                <a:effectLst/>
+                <a:ea typeface="Calibri" panose="020F0502020204030204" pitchFamily="34" charset="0"/>
+                <a:cs typeface="Calibri" panose="020F0502020204030204" pitchFamily="34" charset="0"/>
+              </a:rPr>
+              <a:t>Participants Responsibilities</a:t>
+            </a:r>
+            <a:endParaRPr lang="en-US" sz="2000" dirty="0">
+              <a:effectLst/>
+              <a:ea typeface="Calibri" panose="020F0502020204030204" pitchFamily="34" charset="0"/>
+              <a:cs typeface="Times New Roman" panose="02020603050405020304" pitchFamily="18" charset="0"/>
+            </a:endParaRPr>
+          </a:p>
+          <a:p>
+            <a:pPr marL="1200150" lvl="2" indent="-285750">
+              <a:lnSpc>
+                <a:spcPct val="150000"/>
+              </a:lnSpc>
+              <a:spcBef>
+                <a:spcPts val="0"/>
+              </a:spcBef>
+              <a:buSzPts val="1200"/>
+            </a:pPr>
+            <a:r>
+              <a:rPr lang="en-US" sz="2000" dirty="0">
+                <a:solidFill>
+                  <a:srgbClr val="000000"/>
+                </a:solidFill>
+                <a:effectLst/>
+                <a:ea typeface="Calibri" panose="020F0502020204030204" pitchFamily="34" charset="0"/>
+                <a:cs typeface="Calibri" panose="020F0502020204030204" pitchFamily="34" charset="0"/>
+              </a:rPr>
+              <a:t>A Participant must be licensed to by </a:t>
+            </a:r>
+            <a:r>
+              <a:rPr lang="en-US" sz="2000" dirty="0">
+                <a:solidFill>
+                  <a:srgbClr val="C00000"/>
+                </a:solidFill>
+                <a:effectLst/>
+                <a:ea typeface="Calibri" panose="020F0502020204030204" pitchFamily="34" charset="0"/>
+                <a:cs typeface="Calibri" panose="020F0502020204030204" pitchFamily="34" charset="0"/>
+              </a:rPr>
+              <a:t>&lt;insert relevant regulatory agency&gt;.</a:t>
+            </a:r>
+            <a:endParaRPr lang="en-US" sz="2000" dirty="0">
+              <a:effectLst/>
+              <a:ea typeface="Calibri" panose="020F0502020204030204" pitchFamily="34" charset="0"/>
+              <a:cs typeface="Times New Roman" panose="02020603050405020304" pitchFamily="18" charset="0"/>
+            </a:endParaRPr>
+          </a:p>
+          <a:p>
+            <a:pPr marL="1200150" lvl="2" indent="-285750">
+              <a:lnSpc>
+                <a:spcPct val="150000"/>
+              </a:lnSpc>
+              <a:spcBef>
+                <a:spcPts val="0"/>
+              </a:spcBef>
+              <a:buSzPts val="1200"/>
+            </a:pPr>
+            <a:r>
+              <a:rPr lang="en-US" sz="2000" dirty="0">
+                <a:solidFill>
+                  <a:srgbClr val="000000"/>
+                </a:solidFill>
+                <a:effectLst/>
+                <a:ea typeface="Calibri" panose="020F0502020204030204" pitchFamily="34" charset="0"/>
+                <a:cs typeface="Calibri" panose="020F0502020204030204" pitchFamily="34" charset="0"/>
+              </a:rPr>
+              <a:t>A Participant can play the role of Sending Participant and as a Receiving Participant.</a:t>
+            </a:r>
+            <a:endParaRPr lang="en-US" sz="2000" dirty="0">
+              <a:effectLst/>
+              <a:ea typeface="Calibri" panose="020F0502020204030204" pitchFamily="34" charset="0"/>
+              <a:cs typeface="Times New Roman" panose="02020603050405020304" pitchFamily="18" charset="0"/>
+            </a:endParaRPr>
+          </a:p>
+          <a:p>
+            <a:pPr marL="1200150" lvl="2" indent="-285750">
+              <a:lnSpc>
+                <a:spcPct val="150000"/>
+              </a:lnSpc>
+              <a:spcBef>
+                <a:spcPts val="0"/>
+              </a:spcBef>
+              <a:buSzPts val="1200"/>
+            </a:pPr>
+            <a:r>
+              <a:rPr lang="en-US" sz="2000" dirty="0">
+                <a:solidFill>
+                  <a:srgbClr val="000000"/>
+                </a:solidFill>
+                <a:effectLst/>
+                <a:ea typeface="Calibri" panose="020F0502020204030204" pitchFamily="34" charset="0"/>
+                <a:cs typeface="Calibri" panose="020F0502020204030204" pitchFamily="34" charset="0"/>
+              </a:rPr>
+              <a:t>A Participant must connect to the Payment Hub to perform its roles and responsibilities.</a:t>
+            </a:r>
+            <a:endParaRPr lang="en-US" sz="2000" dirty="0">
+              <a:effectLst/>
+              <a:ea typeface="Calibri" panose="020F0502020204030204" pitchFamily="34" charset="0"/>
+              <a:cs typeface="Times New Roman" panose="02020603050405020304" pitchFamily="18" charset="0"/>
+            </a:endParaRPr>
+          </a:p>
+          <a:p>
+            <a:pPr marL="1200150" lvl="2" indent="-285750">
+              <a:lnSpc>
+                <a:spcPct val="150000"/>
+              </a:lnSpc>
+              <a:spcBef>
+                <a:spcPts val="0"/>
+              </a:spcBef>
+              <a:buSzPts val="1200"/>
+            </a:pPr>
+            <a:r>
+              <a:rPr lang="en-US" sz="2000" dirty="0">
+                <a:solidFill>
+                  <a:srgbClr val="000000"/>
+                </a:solidFill>
+                <a:effectLst/>
+                <a:ea typeface="Calibri" panose="020F0502020204030204" pitchFamily="34" charset="0"/>
+                <a:cs typeface="Calibri" panose="020F0502020204030204" pitchFamily="34" charset="0"/>
+              </a:rPr>
+              <a:t>A Participant must be able to initiate and </a:t>
+            </a:r>
+            <a:r>
+              <a:rPr lang="en-US" sz="2000" dirty="0">
+                <a:effectLst/>
+                <a:ea typeface="Calibri" panose="020F0502020204030204" pitchFamily="34" charset="0"/>
+                <a:cs typeface="Calibri" panose="020F0502020204030204" pitchFamily="34" charset="0"/>
+              </a:rPr>
+              <a:t>receive all Value and Non-Value Messages in support of the Funds Transfer flows relevant to its role as Direct or Indirect Participant. </a:t>
+            </a:r>
+            <a:endParaRPr lang="en-US" sz="2000" dirty="0">
+              <a:effectLst/>
+              <a:ea typeface="Calibri" panose="020F0502020204030204" pitchFamily="34" charset="0"/>
+              <a:cs typeface="Times New Roman" panose="02020603050405020304" pitchFamily="18" charset="0"/>
+            </a:endParaRPr>
+          </a:p>
+          <a:p>
+            <a:pPr marL="1200150" lvl="2" indent="-285750">
+              <a:lnSpc>
+                <a:spcPct val="150000"/>
+              </a:lnSpc>
+              <a:spcBef>
+                <a:spcPts val="0"/>
+              </a:spcBef>
+              <a:buSzPts val="1200"/>
+            </a:pPr>
+            <a:r>
+              <a:rPr lang="en-US" sz="2000" dirty="0">
+                <a:effectLst/>
+                <a:ea typeface="Calibri" panose="020F0502020204030204" pitchFamily="34" charset="0"/>
+                <a:cs typeface="Calibri" panose="020F0502020204030204" pitchFamily="34" charset="0"/>
+              </a:rPr>
+              <a:t>A Participant must support the Channels outlined in this Rulebook.</a:t>
+            </a:r>
+            <a:endParaRPr lang="en-US" sz="2000" dirty="0">
+              <a:effectLst/>
+              <a:ea typeface="Calibri" panose="020F0502020204030204" pitchFamily="34" charset="0"/>
+              <a:cs typeface="Times New Roman" panose="02020603050405020304" pitchFamily="18" charset="0"/>
+            </a:endParaRPr>
+          </a:p>
+          <a:p>
+            <a:pPr marL="1200150" lvl="2" indent="-285750">
+              <a:lnSpc>
+                <a:spcPct val="150000"/>
+              </a:lnSpc>
+              <a:spcBef>
+                <a:spcPts val="0"/>
+              </a:spcBef>
+              <a:buSzPts val="1200"/>
+            </a:pPr>
+            <a:r>
+              <a:rPr lang="en-US" sz="2000" dirty="0">
+                <a:effectLst/>
+                <a:ea typeface="Calibri" panose="020F0502020204030204" pitchFamily="34" charset="0"/>
+                <a:cs typeface="Times New Roman" panose="02020603050405020304" pitchFamily="18" charset="0"/>
+              </a:rPr>
+              <a:t>A Participant must be able to access the Participant Portal.</a:t>
+            </a:r>
+          </a:p>
+          <a:p>
+            <a:pPr marL="1200150" lvl="2" indent="-285750">
+              <a:lnSpc>
+                <a:spcPct val="150000"/>
+              </a:lnSpc>
+              <a:spcBef>
+                <a:spcPts val="0"/>
+              </a:spcBef>
+              <a:buSzPts val="1200"/>
+            </a:pPr>
+            <a:r>
+              <a:rPr lang="en-US" sz="2000" dirty="0">
+                <a:effectLst/>
+                <a:ea typeface="Calibri" panose="020F0502020204030204" pitchFamily="34" charset="0"/>
+                <a:cs typeface="Calibri" panose="020F0502020204030204" pitchFamily="34" charset="0"/>
+              </a:rPr>
+              <a:t>A Participant must have sufficient and appropriate staff to perform its roles and responsibilities in accordance with the Rulebook.</a:t>
+            </a:r>
+            <a:endParaRPr lang="en-US" sz="2000" dirty="0">
+              <a:effectLst/>
+              <a:ea typeface="Calibri" panose="020F0502020204030204" pitchFamily="34" charset="0"/>
+              <a:cs typeface="Times New Roman" panose="02020603050405020304" pitchFamily="18" charset="0"/>
+            </a:endParaRPr>
+          </a:p>
+          <a:p>
+            <a:pPr marL="1200150" lvl="2" indent="-285750">
+              <a:lnSpc>
+                <a:spcPct val="150000"/>
+              </a:lnSpc>
+              <a:spcBef>
+                <a:spcPts val="0"/>
+              </a:spcBef>
+              <a:buSzPts val="1200"/>
+            </a:pPr>
+            <a:r>
+              <a:rPr lang="en-US" sz="2000" dirty="0">
+                <a:effectLst/>
+                <a:ea typeface="Calibri" panose="020F0502020204030204" pitchFamily="34" charset="0"/>
+                <a:cs typeface="Times New Roman" panose="02020603050405020304" pitchFamily="18" charset="0"/>
+              </a:rPr>
+              <a:t>A Participant must pay all relevant Fees according to the terms outlined in this Rulebook.   </a:t>
+            </a:r>
+          </a:p>
+          <a:p>
+            <a:pPr marL="1200150" lvl="2" indent="-285750">
+              <a:lnSpc>
+                <a:spcPct val="150000"/>
+              </a:lnSpc>
+              <a:spcBef>
+                <a:spcPts val="0"/>
+              </a:spcBef>
+              <a:buSzPts val="1200"/>
+            </a:pPr>
+            <a:r>
+              <a:rPr lang="en-US" sz="2000" dirty="0">
+                <a:effectLst/>
+                <a:ea typeface="Calibri" panose="020F0502020204030204" pitchFamily="34" charset="0"/>
+                <a:cs typeface="Times New Roman" panose="02020603050405020304" pitchFamily="18" charset="0"/>
+              </a:rPr>
+              <a:t>A Participant must sign a Participation Agreement and any other relevant Agreement required to perform specific roles.  </a:t>
+            </a:r>
+          </a:p>
+          <a:p>
+            <a:pPr marL="1200150" lvl="2" indent="-285750">
+              <a:lnSpc>
+                <a:spcPct val="150000"/>
+              </a:lnSpc>
+              <a:spcBef>
+                <a:spcPts val="0"/>
+              </a:spcBef>
+              <a:buSzPts val="1200"/>
+            </a:pPr>
+            <a:endParaRPr lang="en-US" sz="2000" dirty="0">
+              <a:effectLst/>
+              <a:ea typeface="Calibri" panose="020F0502020204030204" pitchFamily="34" charset="0"/>
+              <a:cs typeface="Times New Roman" panose="02020603050405020304" pitchFamily="18" charset="0"/>
+            </a:endParaRPr>
+          </a:p>
+          <a:p>
+            <a:pPr marL="0" lvl="1" indent="0">
+              <a:lnSpc>
+                <a:spcPct val="150000"/>
+              </a:lnSpc>
+              <a:spcBef>
+                <a:spcPts val="0"/>
+              </a:spcBef>
+              <a:buSzPts val="1200"/>
+              <a:buNone/>
+            </a:pPr>
+            <a:r>
+              <a:rPr lang="en-US" sz="2000" b="1" dirty="0">
+                <a:solidFill>
+                  <a:srgbClr val="000000"/>
+                </a:solidFill>
+                <a:effectLst/>
+                <a:ea typeface="Calibri" panose="020F0502020204030204" pitchFamily="34" charset="0"/>
+                <a:cs typeface="Calibri" panose="020F0502020204030204" pitchFamily="34" charset="0"/>
+              </a:rPr>
+              <a:t>The Scheme defines two types of Participants. Additional roles and responsibilities apply to each Participant type:</a:t>
+            </a:r>
+            <a:endParaRPr lang="en-US" sz="2000" b="1" dirty="0">
+              <a:effectLst/>
+              <a:ea typeface="Calibri" panose="020F0502020204030204" pitchFamily="34" charset="0"/>
+              <a:cs typeface="Times New Roman" panose="02020603050405020304" pitchFamily="18" charset="0"/>
+            </a:endParaRPr>
+          </a:p>
+          <a:p>
+            <a:pPr marL="1657350" lvl="3" indent="-285750">
+              <a:lnSpc>
+                <a:spcPct val="150000"/>
+              </a:lnSpc>
+              <a:spcBef>
+                <a:spcPts val="0"/>
+              </a:spcBef>
+            </a:pPr>
+            <a:r>
+              <a:rPr lang="en-US" sz="2000" b="1" dirty="0">
+                <a:solidFill>
+                  <a:srgbClr val="000000"/>
+                </a:solidFill>
+                <a:effectLst/>
+                <a:ea typeface="Calibri" panose="020F0502020204030204" pitchFamily="34" charset="0"/>
+                <a:cs typeface="Calibri" panose="020F0502020204030204" pitchFamily="34" charset="0"/>
+              </a:rPr>
+              <a:t>Direct Participant.</a:t>
+            </a:r>
+            <a:r>
+              <a:rPr lang="en-US" sz="2000" dirty="0">
+                <a:solidFill>
+                  <a:srgbClr val="000000"/>
+                </a:solidFill>
+                <a:effectLst/>
+                <a:ea typeface="Calibri" panose="020F0502020204030204" pitchFamily="34" charset="0"/>
+                <a:cs typeface="Calibri" panose="020F0502020204030204" pitchFamily="34" charset="0"/>
+              </a:rPr>
+              <a:t> A Participant that is authorized to have a direct Settlement Account with the Settlement Bank. </a:t>
+            </a:r>
+            <a:endParaRPr lang="en-US" sz="2000" dirty="0">
+              <a:effectLst/>
+              <a:ea typeface="Calibri" panose="020F0502020204030204" pitchFamily="34" charset="0"/>
+              <a:cs typeface="Times New Roman" panose="02020603050405020304" pitchFamily="18" charset="0"/>
+            </a:endParaRPr>
+          </a:p>
+          <a:p>
+            <a:pPr marL="2114550" lvl="4" indent="-285750">
+              <a:lnSpc>
+                <a:spcPct val="150000"/>
+              </a:lnSpc>
+              <a:spcBef>
+                <a:spcPts val="0"/>
+              </a:spcBef>
+            </a:pPr>
+            <a:r>
+              <a:rPr lang="en-US" sz="2000" dirty="0">
+                <a:solidFill>
+                  <a:srgbClr val="000000"/>
+                </a:solidFill>
+                <a:effectLst/>
+                <a:ea typeface="Calibri" panose="020F0502020204030204" pitchFamily="34" charset="0"/>
+                <a:cs typeface="Calibri" panose="020F0502020204030204" pitchFamily="34" charset="0"/>
+              </a:rPr>
+              <a:t>A Direct Participant must be able to exchange messages with the Settlement Bank to execute Settlement. </a:t>
+            </a:r>
+            <a:endParaRPr lang="en-US" sz="2000" dirty="0">
+              <a:effectLst/>
+              <a:ea typeface="Calibri" panose="020F0502020204030204" pitchFamily="34" charset="0"/>
+              <a:cs typeface="Times New Roman" panose="02020603050405020304" pitchFamily="18" charset="0"/>
+            </a:endParaRPr>
+          </a:p>
+          <a:p>
+            <a:pPr marL="2114550" lvl="4" indent="-285750">
+              <a:lnSpc>
+                <a:spcPct val="150000"/>
+              </a:lnSpc>
+              <a:spcBef>
+                <a:spcPts val="0"/>
+              </a:spcBef>
+            </a:pPr>
+            <a:r>
+              <a:rPr lang="en-US" sz="2000" dirty="0">
+                <a:solidFill>
+                  <a:srgbClr val="000000"/>
+                </a:solidFill>
+                <a:effectLst/>
+                <a:ea typeface="Calibri" panose="020F0502020204030204" pitchFamily="34" charset="0"/>
+                <a:cs typeface="Calibri" panose="020F0502020204030204" pitchFamily="34" charset="0"/>
+              </a:rPr>
+              <a:t>A Direct Participant may serve as a Settlement Sponsor to an Indirect Participant.</a:t>
+            </a:r>
+            <a:endParaRPr lang="en-US" sz="2000" dirty="0">
+              <a:effectLst/>
+              <a:ea typeface="Calibri" panose="020F0502020204030204" pitchFamily="34" charset="0"/>
+              <a:cs typeface="Times New Roman" panose="02020603050405020304" pitchFamily="18" charset="0"/>
+            </a:endParaRPr>
+          </a:p>
+          <a:p>
+            <a:pPr marL="2114550" lvl="4" indent="-285750">
+              <a:lnSpc>
+                <a:spcPct val="150000"/>
+              </a:lnSpc>
+              <a:spcBef>
+                <a:spcPts val="0"/>
+              </a:spcBef>
+            </a:pPr>
+            <a:r>
+              <a:rPr lang="en-US" sz="2000" dirty="0">
+                <a:solidFill>
+                  <a:srgbClr val="000000"/>
+                </a:solidFill>
+                <a:effectLst/>
+                <a:ea typeface="Calibri" panose="020F0502020204030204" pitchFamily="34" charset="0"/>
+                <a:cs typeface="Calibri" panose="020F0502020204030204" pitchFamily="34" charset="0"/>
+              </a:rPr>
+              <a:t>A Direct Participant that serves as a Settlement Sponsor to an Indirect Participant must register each Indirect Participant it Sponsors (Sponsored Participant) with the Scheme.</a:t>
+            </a:r>
+            <a:endParaRPr lang="en-US" sz="2000" dirty="0">
+              <a:effectLst/>
+              <a:ea typeface="Calibri" panose="020F0502020204030204" pitchFamily="34" charset="0"/>
+              <a:cs typeface="Times New Roman" panose="02020603050405020304" pitchFamily="18" charset="0"/>
+            </a:endParaRPr>
+          </a:p>
+          <a:p>
+            <a:pPr marL="1657350" lvl="3" indent="-285750">
+              <a:lnSpc>
+                <a:spcPct val="150000"/>
+              </a:lnSpc>
+              <a:spcBef>
+                <a:spcPts val="0"/>
+              </a:spcBef>
+            </a:pPr>
+            <a:r>
+              <a:rPr lang="en-US" sz="2000" b="1" dirty="0">
+                <a:solidFill>
+                  <a:srgbClr val="000000"/>
+                </a:solidFill>
+                <a:effectLst/>
+                <a:ea typeface="Calibri" panose="020F0502020204030204" pitchFamily="34" charset="0"/>
+                <a:cs typeface="Calibri" panose="020F0502020204030204" pitchFamily="34" charset="0"/>
+              </a:rPr>
+              <a:t>Indirect Participant.</a:t>
+            </a:r>
+            <a:r>
+              <a:rPr lang="en-US" sz="2000" dirty="0">
+                <a:solidFill>
+                  <a:srgbClr val="000000"/>
+                </a:solidFill>
+                <a:effectLst/>
+                <a:ea typeface="Calibri" panose="020F0502020204030204" pitchFamily="34" charset="0"/>
+                <a:cs typeface="Calibri" panose="020F0502020204030204" pitchFamily="34" charset="0"/>
+              </a:rPr>
+              <a:t> </a:t>
+            </a:r>
+            <a:r>
+              <a:rPr lang="en-US" sz="2000" dirty="0">
+                <a:solidFill>
+                  <a:srgbClr val="000000"/>
+                </a:solidFill>
+                <a:effectLst/>
+                <a:ea typeface="Calibri" panose="020F0502020204030204" pitchFamily="34" charset="0"/>
+                <a:cs typeface="Times New Roman" panose="02020603050405020304" pitchFamily="18" charset="0"/>
+              </a:rPr>
+              <a:t> </a:t>
+            </a:r>
+            <a:r>
+              <a:rPr lang="en-US" sz="2000" dirty="0">
+                <a:effectLst/>
+                <a:ea typeface="Calibri" panose="020F0502020204030204" pitchFamily="34" charset="0"/>
+                <a:cs typeface="Times New Roman" panose="02020603050405020304" pitchFamily="18" charset="0"/>
+              </a:rPr>
+              <a:t> </a:t>
+            </a:r>
+            <a:r>
+              <a:rPr lang="en-US" sz="2000" dirty="0">
+                <a:solidFill>
+                  <a:srgbClr val="000000"/>
+                </a:solidFill>
+                <a:effectLst/>
+                <a:ea typeface="Calibri" panose="020F0502020204030204" pitchFamily="34" charset="0"/>
+                <a:cs typeface="Calibri" panose="020F0502020204030204" pitchFamily="34" charset="0"/>
+              </a:rPr>
+              <a:t>A Participant that is not authorized to have a direct Settlement Account with the Settlement Bank. An Indirect Participant must rely on a Direct Participant for Settlement.</a:t>
+            </a:r>
+            <a:endParaRPr lang="en-US" sz="2000" dirty="0">
+              <a:effectLst/>
+              <a:ea typeface="Calibri" panose="020F0502020204030204" pitchFamily="34" charset="0"/>
+              <a:cs typeface="Times New Roman" panose="02020603050405020304" pitchFamily="18" charset="0"/>
+            </a:endParaRPr>
+          </a:p>
+          <a:p>
+            <a:pPr marL="2114550" lvl="4" indent="-285750">
+              <a:lnSpc>
+                <a:spcPct val="150000"/>
+              </a:lnSpc>
+              <a:spcBef>
+                <a:spcPts val="0"/>
+              </a:spcBef>
+            </a:pPr>
+            <a:r>
+              <a:rPr lang="en-US" sz="2000" dirty="0">
+                <a:solidFill>
+                  <a:srgbClr val="000000"/>
+                </a:solidFill>
+                <a:effectLst/>
+                <a:ea typeface="Calibri" panose="020F0502020204030204" pitchFamily="34" charset="0"/>
+                <a:cs typeface="Calibri" panose="020F0502020204030204" pitchFamily="34" charset="0"/>
+              </a:rPr>
+              <a:t>An Indirect Participant must use a Direct Participant to serve as its Settlement Sponsor.</a:t>
+            </a:r>
+            <a:endParaRPr lang="en-US" sz="2000" dirty="0">
+              <a:effectLst/>
+              <a:ea typeface="Calibri" panose="020F0502020204030204" pitchFamily="34" charset="0"/>
+              <a:cs typeface="Times New Roman" panose="02020603050405020304" pitchFamily="18" charset="0"/>
+            </a:endParaRPr>
+          </a:p>
+          <a:p>
+            <a:pPr marL="2114550" lvl="4" indent="-285750">
+              <a:lnSpc>
+                <a:spcPct val="150000"/>
+              </a:lnSpc>
+              <a:spcBef>
+                <a:spcPts val="0"/>
+              </a:spcBef>
+            </a:pPr>
+            <a:r>
+              <a:rPr lang="en-US" sz="2000" dirty="0">
+                <a:solidFill>
+                  <a:srgbClr val="000000"/>
+                </a:solidFill>
+                <a:effectLst/>
+                <a:ea typeface="Calibri" panose="020F0502020204030204" pitchFamily="34" charset="0"/>
+                <a:cs typeface="Calibri" panose="020F0502020204030204" pitchFamily="34" charset="0"/>
+              </a:rPr>
+              <a:t>An Indirect Participant must be able to exchange messages with the Direct Participant to execute Settlement.</a:t>
+            </a:r>
+            <a:endParaRPr lang="en-US" sz="2000" dirty="0">
+              <a:effectLst/>
+              <a:ea typeface="Calibri" panose="020F0502020204030204" pitchFamily="34" charset="0"/>
+              <a:cs typeface="Times New Roman" panose="02020603050405020304" pitchFamily="18" charset="0"/>
+            </a:endParaRPr>
+          </a:p>
+          <a:p>
+            <a:pPr marL="2114550" lvl="4" indent="-285750">
+              <a:lnSpc>
+                <a:spcPct val="150000"/>
+              </a:lnSpc>
+              <a:spcBef>
+                <a:spcPts val="0"/>
+              </a:spcBef>
+            </a:pPr>
+            <a:r>
+              <a:rPr lang="en-US" sz="2000" dirty="0">
+                <a:solidFill>
+                  <a:srgbClr val="000000"/>
+                </a:solidFill>
+                <a:effectLst/>
+                <a:ea typeface="Calibri" panose="020F0502020204030204" pitchFamily="34" charset="0"/>
+                <a:cs typeface="Calibri" panose="020F0502020204030204" pitchFamily="34" charset="0"/>
+              </a:rPr>
+              <a:t>An Indirect Participant must be registered with the Scheme as a Sponsored Participant.  </a:t>
+            </a:r>
+            <a:endParaRPr lang="en-US" sz="2000" dirty="0">
+              <a:effectLst/>
+              <a:ea typeface="Calibri" panose="020F0502020204030204" pitchFamily="34" charset="0"/>
+              <a:cs typeface="Times New Roman" panose="02020603050405020304" pitchFamily="18" charset="0"/>
+            </a:endParaRPr>
+          </a:p>
+        </p:txBody>
+      </p:sp>
+      <p:sp>
+        <p:nvSpPr>
+          <p:cNvPr id="4" name="Slide Number Placeholder 3">
+            <a:extLst>
+              <a:ext uri="{FF2B5EF4-FFF2-40B4-BE49-F238E27FC236}">
+                <a16:creationId xmlns:a16="http://schemas.microsoft.com/office/drawing/2014/main" id="{F0DF7579-6043-AA5F-D4A5-FE436F489BB0}"/>
+              </a:ext>
+            </a:extLst>
+          </p:cNvPr>
+          <p:cNvSpPr>
+            <a:spLocks noGrp="1"/>
+          </p:cNvSpPr>
+          <p:nvPr>
+            <p:ph type="sldNum" sz="quarter" idx="12"/>
+          </p:nvPr>
+        </p:nvSpPr>
+        <p:spPr/>
+        <p:txBody>
+          <a:bodyPr/>
+          <a:lstStyle/>
+          <a:p>
+            <a:fld id="{20AF9D7A-5BEE-9245-944A-197F51D542D9}" type="slidenum">
+              <a:rPr lang="en-US" smtClean="0"/>
+              <a:t>10</a:t>
+            </a:fld>
+            <a:endParaRPr lang="en-US"/>
+          </a:p>
+        </p:txBody>
+      </p:sp>
+    </p:spTree>
+    <p:extLst>
+      <p:ext uri="{BB962C8B-B14F-4D97-AF65-F5344CB8AC3E}">
+        <p14:creationId xmlns:p14="http://schemas.microsoft.com/office/powerpoint/2010/main" val="1439505580"/>
+      </p:ext>
+    </p:extLst>
+  </p:cSld>
+  <p:clrMapOvr>
+    <a:masterClrMapping/>
+  </p:clrMapOvr>
+</p:sld>
+</file>
+
+<file path=ppt/slides/slide11.xml><?xml version="1.0" encoding="utf-8"?>
+<p:sld xmlns:a="http://schemas.openxmlformats.org/drawingml/2006/main" xmlns:r="http://schemas.openxmlformats.org/officeDocument/2006/relationships" xmlns:p="http://schemas.openxmlformats.org/presentationml/2006/main">
+  <p:cSld>
+    <p:spTree>
+      <p:nvGrpSpPr>
+        <p:cNvPr id="1" name=""/>
+        <p:cNvGrpSpPr/>
+        <p:nvPr/>
+      </p:nvGrpSpPr>
+      <p:grpSpPr>
+        <a:xfrm>
+          <a:off x="0" y="0"/>
+          <a:ext cx="0" cy="0"/>
+          <a:chOff x="0" y="0"/>
+          <a:chExt cx="0" cy="0"/>
+        </a:xfrm>
+      </p:grpSpPr>
+      <p:sp>
+        <p:nvSpPr>
+          <p:cNvPr id="2" name="Title 1">
+            <a:extLst>
+              <a:ext uri="{FF2B5EF4-FFF2-40B4-BE49-F238E27FC236}">
+                <a16:creationId xmlns:a16="http://schemas.microsoft.com/office/drawing/2014/main" id="{68E393EF-C4FC-7C5D-3EBE-FD83BA9D894B}"/>
+              </a:ext>
+            </a:extLst>
+          </p:cNvPr>
+          <p:cNvSpPr>
+            <a:spLocks noGrp="1"/>
+          </p:cNvSpPr>
+          <p:nvPr>
+            <p:ph type="title"/>
+          </p:nvPr>
+        </p:nvSpPr>
+        <p:spPr/>
+        <p:txBody>
+          <a:bodyPr>
+            <a:normAutofit fontScale="90000"/>
+          </a:bodyPr>
+          <a:lstStyle/>
+          <a:p>
+            <a:r>
+              <a:rPr lang="en-US" dirty="0"/>
+              <a:t>Let’s Walk Through an Example: Expanding on Roles after the POC</a:t>
+            </a:r>
+          </a:p>
+        </p:txBody>
+      </p:sp>
+      <p:sp>
+        <p:nvSpPr>
+          <p:cNvPr id="3" name="Content Placeholder 2">
+            <a:extLst>
+              <a:ext uri="{FF2B5EF4-FFF2-40B4-BE49-F238E27FC236}">
+                <a16:creationId xmlns:a16="http://schemas.microsoft.com/office/drawing/2014/main" id="{82A11BD5-889A-009B-2F6E-C1E5CB86E500}"/>
+              </a:ext>
+            </a:extLst>
+          </p:cNvPr>
+          <p:cNvSpPr>
+            <a:spLocks noGrp="1"/>
+          </p:cNvSpPr>
+          <p:nvPr>
+            <p:ph idx="1"/>
+          </p:nvPr>
+        </p:nvSpPr>
+        <p:spPr/>
+        <p:txBody>
+          <a:bodyPr>
+            <a:normAutofit/>
+          </a:bodyPr>
+          <a:lstStyle/>
+          <a:p>
+            <a:pPr marL="0" marR="0" lvl="0" indent="0">
+              <a:lnSpc>
+                <a:spcPct val="100000"/>
+              </a:lnSpc>
+              <a:spcBef>
+                <a:spcPts val="0"/>
+              </a:spcBef>
+              <a:spcAft>
+                <a:spcPts val="600"/>
+              </a:spcAft>
+              <a:buNone/>
+            </a:pPr>
+            <a:r>
+              <a:rPr lang="en-US" sz="3200" dirty="0">
+                <a:solidFill>
+                  <a:srgbClr val="4472C4"/>
+                </a:solidFill>
+                <a:effectLst/>
+                <a:ea typeface="Calibri" panose="020F0502020204030204" pitchFamily="34" charset="0"/>
+                <a:cs typeface="Calibri" panose="020F0502020204030204" pitchFamily="34" charset="0"/>
+              </a:rPr>
+              <a:t>Scheme Manager and Payment Hub Operator may be the same or different Entities. This needs to be defined for each Scheme:</a:t>
+            </a:r>
+          </a:p>
+          <a:p>
+            <a:pPr marL="0" marR="0" lvl="0" indent="0">
+              <a:lnSpc>
+                <a:spcPct val="100000"/>
+              </a:lnSpc>
+              <a:spcBef>
+                <a:spcPts val="0"/>
+              </a:spcBef>
+              <a:spcAft>
+                <a:spcPts val="600"/>
+              </a:spcAft>
+              <a:buNone/>
+            </a:pPr>
+            <a:r>
+              <a:rPr lang="en-US" sz="3200" dirty="0">
+                <a:solidFill>
+                  <a:srgbClr val="4472C4"/>
+                </a:solidFill>
+                <a:effectLst/>
+                <a:ea typeface="Calibri" panose="020F0502020204030204" pitchFamily="34" charset="0"/>
+                <a:cs typeface="Calibri" panose="020F0502020204030204" pitchFamily="34" charset="0"/>
+              </a:rPr>
+              <a:t> </a:t>
+            </a:r>
+            <a:endParaRPr lang="en-US" sz="3200" dirty="0">
+              <a:effectLst/>
+              <a:ea typeface="Calibri" panose="020F0502020204030204" pitchFamily="34" charset="0"/>
+              <a:cs typeface="Times New Roman" panose="02020603050405020304" pitchFamily="18" charset="0"/>
+            </a:endParaRPr>
+          </a:p>
+          <a:p>
+            <a:pPr marL="342900" marR="0" lvl="0" indent="-342900">
+              <a:lnSpc>
+                <a:spcPct val="100000"/>
+              </a:lnSpc>
+              <a:spcBef>
+                <a:spcPts val="0"/>
+              </a:spcBef>
+              <a:spcAft>
+                <a:spcPts val="600"/>
+              </a:spcAft>
+              <a:buFont typeface="Symbol" pitchFamily="2" charset="2"/>
+              <a:buChar char=""/>
+            </a:pPr>
+            <a:r>
+              <a:rPr lang="en-US" sz="3200" b="1" dirty="0">
+                <a:solidFill>
+                  <a:srgbClr val="4472C4"/>
+                </a:solidFill>
+                <a:effectLst/>
+                <a:ea typeface="Calibri" panose="020F0502020204030204" pitchFamily="34" charset="0"/>
+                <a:cs typeface="Calibri" panose="020F0502020204030204" pitchFamily="34" charset="0"/>
+              </a:rPr>
+              <a:t>Different Types of Participants.</a:t>
+            </a:r>
+            <a:r>
+              <a:rPr lang="en-US" sz="3200" dirty="0">
+                <a:solidFill>
+                  <a:srgbClr val="4472C4"/>
+                </a:solidFill>
+                <a:effectLst/>
+                <a:ea typeface="Calibri" panose="020F0502020204030204" pitchFamily="34" charset="0"/>
+                <a:cs typeface="Calibri" panose="020F0502020204030204" pitchFamily="34" charset="0"/>
+              </a:rPr>
+              <a:t> Note that there is no single definition of Participant that applies equally to each Scheme and thus, the definitions provided for the POC may need to be refined or expanded, and other definitions may need to be added. Schemes may define Direct and Indirect Participants differently and may identify other/additional categories of Participants. The definitions included in this Rulebook are based on current understanding of the list of Participants. It is critical that the Scheme is precise in its definitions and in clearly outlining the roles and responsibilities of each type of Participant. </a:t>
+            </a:r>
+            <a:endParaRPr lang="en-US" sz="3200" dirty="0">
+              <a:effectLst/>
+              <a:ea typeface="Calibri" panose="020F0502020204030204" pitchFamily="34" charset="0"/>
+              <a:cs typeface="Times New Roman" panose="02020603050405020304" pitchFamily="18" charset="0"/>
+            </a:endParaRPr>
+          </a:p>
+          <a:p>
+            <a:pPr marL="342900" marR="0" lvl="0" indent="-342900">
+              <a:lnSpc>
+                <a:spcPct val="100000"/>
+              </a:lnSpc>
+              <a:spcBef>
+                <a:spcPts val="0"/>
+              </a:spcBef>
+              <a:spcAft>
+                <a:spcPts val="600"/>
+              </a:spcAft>
+              <a:buFont typeface="Symbol" pitchFamily="2" charset="2"/>
+              <a:buChar char=""/>
+            </a:pPr>
+            <a:r>
+              <a:rPr lang="en-US" sz="3200" b="1" dirty="0">
+                <a:solidFill>
+                  <a:srgbClr val="4472C4"/>
+                </a:solidFill>
+                <a:effectLst/>
+                <a:ea typeface="Calibri" panose="020F0502020204030204" pitchFamily="34" charset="0"/>
+                <a:cs typeface="Calibri" panose="020F0502020204030204" pitchFamily="34" charset="0"/>
+              </a:rPr>
+              <a:t>Technical Service Provider (TSP).</a:t>
+            </a:r>
+            <a:r>
+              <a:rPr lang="en-US" sz="3200" dirty="0">
+                <a:solidFill>
+                  <a:srgbClr val="4472C4"/>
+                </a:solidFill>
+                <a:effectLst/>
+                <a:ea typeface="Calibri" panose="020F0502020204030204" pitchFamily="34" charset="0"/>
+                <a:cs typeface="Calibri" panose="020F0502020204030204" pitchFamily="34" charset="0"/>
+              </a:rPr>
+              <a:t> A Service Provider that provides the technical connection to the Payment Hub for a Participant and may provide other supporting services. A Technical Service Provider is typically required to adhere to the rules defined in the Technical Service Provider Agreement and other relevant SLAs. In addition, there are sometimes rules in the Scheme Rulebook for Technical Service Providers. If you create a TSP role, it is important to note in the Rulebook that reliance on a TSP by a Participant </a:t>
+            </a:r>
+            <a:r>
+              <a:rPr lang="en-US" sz="3200" u="sng" dirty="0">
+                <a:solidFill>
+                  <a:srgbClr val="4472C4"/>
+                </a:solidFill>
+                <a:effectLst/>
+                <a:ea typeface="Calibri" panose="020F0502020204030204" pitchFamily="34" charset="0"/>
+                <a:cs typeface="Calibri" panose="020F0502020204030204" pitchFamily="34" charset="0"/>
+              </a:rPr>
+              <a:t>does not</a:t>
+            </a:r>
+            <a:r>
+              <a:rPr lang="en-US" sz="3200" dirty="0">
+                <a:solidFill>
+                  <a:srgbClr val="4472C4"/>
+                </a:solidFill>
+                <a:effectLst/>
+                <a:ea typeface="Calibri" panose="020F0502020204030204" pitchFamily="34" charset="0"/>
+                <a:cs typeface="Calibri" panose="020F0502020204030204" pitchFamily="34" charset="0"/>
+              </a:rPr>
+              <a:t> relieve the Participant from its full obligations defined in the Rulebook. </a:t>
+            </a:r>
+            <a:endParaRPr lang="en-US" sz="3200" dirty="0">
+              <a:effectLst/>
+              <a:ea typeface="Calibri" panose="020F0502020204030204" pitchFamily="34" charset="0"/>
+              <a:cs typeface="Times New Roman" panose="02020603050405020304" pitchFamily="18" charset="0"/>
+            </a:endParaRPr>
+          </a:p>
+          <a:p>
+            <a:pPr marL="342900" marR="0" lvl="0" indent="-342900">
+              <a:lnSpc>
+                <a:spcPct val="100000"/>
+              </a:lnSpc>
+              <a:spcBef>
+                <a:spcPts val="0"/>
+              </a:spcBef>
+              <a:spcAft>
+                <a:spcPts val="600"/>
+              </a:spcAft>
+              <a:buFont typeface="Symbol" pitchFamily="2" charset="2"/>
+              <a:buChar char=""/>
+            </a:pPr>
+            <a:r>
+              <a:rPr lang="en-US" sz="3200" b="1" dirty="0">
+                <a:solidFill>
+                  <a:srgbClr val="4472C4"/>
+                </a:solidFill>
+                <a:effectLst/>
+                <a:ea typeface="Calibri" panose="020F0502020204030204" pitchFamily="34" charset="0"/>
+                <a:cs typeface="Calibri" panose="020F0502020204030204" pitchFamily="34" charset="0"/>
+              </a:rPr>
+              <a:t>Payment Initiator Service Provider (PISP).</a:t>
+            </a:r>
+            <a:r>
+              <a:rPr lang="en-US" sz="3200" dirty="0">
+                <a:solidFill>
+                  <a:srgbClr val="4472C4"/>
+                </a:solidFill>
+                <a:effectLst/>
+                <a:ea typeface="Calibri" panose="020F0502020204030204" pitchFamily="34" charset="0"/>
+                <a:cs typeface="Calibri" panose="020F0502020204030204" pitchFamily="34" charset="0"/>
+              </a:rPr>
+              <a:t> An Entity that is authorized to connect directly to the Payment Hub for the purposes of sending and receiving messages on behalf of the End User. A Payment Initiator is not a Participant but is bound to rules outlined in the Payment Initiator Agreement. Typically, a Payment Initiator does not provide End User Accounts, but can provide the interface for End Users to initiate a Funds Transfer. </a:t>
+            </a:r>
+            <a:endParaRPr lang="en-US" sz="3200" dirty="0">
+              <a:effectLst/>
+              <a:ea typeface="Calibri" panose="020F0502020204030204" pitchFamily="34" charset="0"/>
+              <a:cs typeface="Times New Roman" panose="02020603050405020304" pitchFamily="18" charset="0"/>
+            </a:endParaRPr>
+          </a:p>
+          <a:p>
+            <a:endParaRPr lang="en-US" sz="7200" dirty="0"/>
+          </a:p>
+        </p:txBody>
+      </p:sp>
+      <p:sp>
+        <p:nvSpPr>
+          <p:cNvPr id="4" name="Slide Number Placeholder 3">
+            <a:extLst>
+              <a:ext uri="{FF2B5EF4-FFF2-40B4-BE49-F238E27FC236}">
+                <a16:creationId xmlns:a16="http://schemas.microsoft.com/office/drawing/2014/main" id="{CF10F134-362C-2B4A-CBC3-26313A2892B3}"/>
+              </a:ext>
+            </a:extLst>
+          </p:cNvPr>
+          <p:cNvSpPr>
+            <a:spLocks noGrp="1"/>
+          </p:cNvSpPr>
+          <p:nvPr>
+            <p:ph type="sldNum" sz="quarter" idx="12"/>
+          </p:nvPr>
+        </p:nvSpPr>
+        <p:spPr/>
+        <p:txBody>
+          <a:bodyPr/>
+          <a:lstStyle/>
+          <a:p>
+            <a:fld id="{20AF9D7A-5BEE-9245-944A-197F51D542D9}" type="slidenum">
+              <a:rPr lang="en-US" smtClean="0"/>
+              <a:t>11</a:t>
+            </a:fld>
+            <a:endParaRPr lang="en-US"/>
+          </a:p>
+        </p:txBody>
+      </p:sp>
+    </p:spTree>
+    <p:extLst>
+      <p:ext uri="{BB962C8B-B14F-4D97-AF65-F5344CB8AC3E}">
+        <p14:creationId xmlns:p14="http://schemas.microsoft.com/office/powerpoint/2010/main" val="2024194945"/>
+      </p:ext>
+    </p:extLst>
+  </p:cSld>
+  <p:clrMapOvr>
+    <a:masterClrMapping/>
+  </p:clrMapOvr>
+</p:sld>
+</file>
+
+<file path=ppt/slides/slide12.xml><?xml version="1.0" encoding="utf-8"?>
+<p:sld xmlns:a="http://schemas.openxmlformats.org/drawingml/2006/main" xmlns:r="http://schemas.openxmlformats.org/officeDocument/2006/relationships" xmlns:p="http://schemas.openxmlformats.org/presentationml/2006/main">
+  <p:cSld>
+    <p:spTree>
+      <p:nvGrpSpPr>
+        <p:cNvPr id="1" name=""/>
+        <p:cNvGrpSpPr/>
+        <p:nvPr/>
+      </p:nvGrpSpPr>
+      <p:grpSpPr>
+        <a:xfrm>
+          <a:off x="0" y="0"/>
+          <a:ext cx="0" cy="0"/>
+          <a:chOff x="0" y="0"/>
+          <a:chExt cx="0" cy="0"/>
+        </a:xfrm>
+      </p:grpSpPr>
+      <p:sp>
+        <p:nvSpPr>
+          <p:cNvPr id="2" name="Title 1">
+            <a:extLst>
+              <a:ext uri="{FF2B5EF4-FFF2-40B4-BE49-F238E27FC236}">
                 <a16:creationId xmlns:a16="http://schemas.microsoft.com/office/drawing/2014/main" id="{76324562-8444-1249-C483-249BE743396C}"/>
               </a:ext>
             </a:extLst>
@@ -3638,7 +4635,7 @@
           <a:p>
             <a:fld id="{20AF9D7A-5BEE-9245-944A-197F51D542D9}" type="slidenum">
               <a:rPr lang="en-US" smtClean="0"/>
-              <a:t>10</a:t>
+              <a:t>12</a:t>
             </a:fld>
             <a:endParaRPr lang="en-US"/>
           </a:p>
@@ -4627,6 +5624,313 @@
           <p:cNvPr id="2" name="Title 1">
             <a:extLst>
               <a:ext uri="{FF2B5EF4-FFF2-40B4-BE49-F238E27FC236}">
+                <a16:creationId xmlns:a16="http://schemas.microsoft.com/office/drawing/2014/main" id="{00546038-E85C-D75F-F51E-1B6B752437A3}"/>
+              </a:ext>
+            </a:extLst>
+          </p:cNvPr>
+          <p:cNvSpPr>
+            <a:spLocks noGrp="1"/>
+          </p:cNvSpPr>
+          <p:nvPr>
+            <p:ph type="title"/>
+          </p:nvPr>
+        </p:nvSpPr>
+        <p:spPr/>
+        <p:txBody>
+          <a:bodyPr>
+            <a:normAutofit fontScale="90000"/>
+          </a:bodyPr>
+          <a:lstStyle/>
+          <a:p>
+            <a:r>
+              <a:rPr lang="en-US" dirty="0"/>
+              <a:t>An Instant Payments System Includes a Scheme and a Platform</a:t>
+            </a:r>
+          </a:p>
+        </p:txBody>
+      </p:sp>
+      <p:sp>
+        <p:nvSpPr>
+          <p:cNvPr id="3" name="Content Placeholder 2">
+            <a:extLst>
+              <a:ext uri="{FF2B5EF4-FFF2-40B4-BE49-F238E27FC236}">
+                <a16:creationId xmlns:a16="http://schemas.microsoft.com/office/drawing/2014/main" id="{0DD34F6B-DA5F-4EBC-B666-B90EEEF42659}"/>
+              </a:ext>
+            </a:extLst>
+          </p:cNvPr>
+          <p:cNvSpPr>
+            <a:spLocks noGrp="1"/>
+          </p:cNvSpPr>
+          <p:nvPr>
+            <p:ph idx="1"/>
+          </p:nvPr>
+        </p:nvSpPr>
+        <p:spPr/>
+        <p:txBody>
+          <a:bodyPr/>
+          <a:lstStyle/>
+          <a:p>
+            <a:endParaRPr lang="en-US"/>
+          </a:p>
+        </p:txBody>
+      </p:sp>
+      <p:sp>
+        <p:nvSpPr>
+          <p:cNvPr id="4" name="Slide Number Placeholder 3">
+            <a:extLst>
+              <a:ext uri="{FF2B5EF4-FFF2-40B4-BE49-F238E27FC236}">
+                <a16:creationId xmlns:a16="http://schemas.microsoft.com/office/drawing/2014/main" id="{C0209209-1CFC-1C52-6120-507976FAAFEE}"/>
+              </a:ext>
+            </a:extLst>
+          </p:cNvPr>
+          <p:cNvSpPr>
+            <a:spLocks noGrp="1"/>
+          </p:cNvSpPr>
+          <p:nvPr>
+            <p:ph type="sldNum" sz="quarter" idx="12"/>
+          </p:nvPr>
+        </p:nvSpPr>
+        <p:spPr/>
+        <p:txBody>
+          <a:bodyPr/>
+          <a:lstStyle/>
+          <a:p>
+            <a:fld id="{20AF9D7A-5BEE-9245-944A-197F51D542D9}" type="slidenum">
+              <a:rPr lang="en-US" smtClean="0"/>
+              <a:t>3</a:t>
+            </a:fld>
+            <a:endParaRPr lang="en-US"/>
+          </a:p>
+        </p:txBody>
+      </p:sp>
+      <p:pic>
+        <p:nvPicPr>
+          <p:cNvPr id="17" name="Picture 16">
+            <a:extLst>
+              <a:ext uri="{FF2B5EF4-FFF2-40B4-BE49-F238E27FC236}">
+                <a16:creationId xmlns:a16="http://schemas.microsoft.com/office/drawing/2014/main" id="{924C052A-72F1-7D50-CE72-C385C5504A56}"/>
+              </a:ext>
+            </a:extLst>
+          </p:cNvPr>
+          <p:cNvPicPr>
+            <a:picLocks noChangeAspect="1"/>
+          </p:cNvPicPr>
+          <p:nvPr/>
+        </p:nvPicPr>
+        <p:blipFill>
+          <a:blip r:embed="rId2"/>
+          <a:stretch>
+            <a:fillRect/>
+          </a:stretch>
+        </p:blipFill>
+        <p:spPr>
+          <a:xfrm>
+            <a:off x="567032" y="2236210"/>
+            <a:ext cx="21855646" cy="10523299"/>
+          </a:xfrm>
+          <a:prstGeom prst="rect">
+            <a:avLst/>
+          </a:prstGeom>
+        </p:spPr>
+      </p:pic>
+    </p:spTree>
+    <p:extLst>
+      <p:ext uri="{BB962C8B-B14F-4D97-AF65-F5344CB8AC3E}">
+        <p14:creationId xmlns:p14="http://schemas.microsoft.com/office/powerpoint/2010/main" val="2483059581"/>
+      </p:ext>
+    </p:extLst>
+  </p:cSld>
+  <p:clrMapOvr>
+    <a:masterClrMapping/>
+  </p:clrMapOvr>
+</p:sld>
+</file>
+
+<file path=ppt/slides/slide4.xml><?xml version="1.0" encoding="utf-8"?>
+<p:sld xmlns:a="http://schemas.openxmlformats.org/drawingml/2006/main" xmlns:r="http://schemas.openxmlformats.org/officeDocument/2006/relationships" xmlns:p="http://schemas.openxmlformats.org/presentationml/2006/main">
+  <p:cSld>
+    <p:spTree>
+      <p:nvGrpSpPr>
+        <p:cNvPr id="1" name=""/>
+        <p:cNvGrpSpPr/>
+        <p:nvPr/>
+      </p:nvGrpSpPr>
+      <p:grpSpPr>
+        <a:xfrm>
+          <a:off x="0" y="0"/>
+          <a:ext cx="0" cy="0"/>
+          <a:chOff x="0" y="0"/>
+          <a:chExt cx="0" cy="0"/>
+        </a:xfrm>
+      </p:grpSpPr>
+      <p:sp>
+        <p:nvSpPr>
+          <p:cNvPr id="2" name="Title 1">
+            <a:extLst>
+              <a:ext uri="{FF2B5EF4-FFF2-40B4-BE49-F238E27FC236}">
+                <a16:creationId xmlns:a16="http://schemas.microsoft.com/office/drawing/2014/main" id="{4BF57320-866E-981C-9FA6-49543A6F84E0}"/>
+              </a:ext>
+            </a:extLst>
+          </p:cNvPr>
+          <p:cNvSpPr>
+            <a:spLocks noGrp="1"/>
+          </p:cNvSpPr>
+          <p:nvPr>
+            <p:ph type="title"/>
+          </p:nvPr>
+        </p:nvSpPr>
+        <p:spPr/>
+        <p:txBody>
+          <a:bodyPr>
+            <a:normAutofit fontScale="90000"/>
+          </a:bodyPr>
+          <a:lstStyle/>
+          <a:p>
+            <a:r>
+              <a:rPr lang="en-US" dirty="0"/>
+              <a:t>Criticality of Designing for Inclusivity Across All Aspects</a:t>
+            </a:r>
+          </a:p>
+        </p:txBody>
+      </p:sp>
+      <p:sp>
+        <p:nvSpPr>
+          <p:cNvPr id="4" name="Slide Number Placeholder 3">
+            <a:extLst>
+              <a:ext uri="{FF2B5EF4-FFF2-40B4-BE49-F238E27FC236}">
+                <a16:creationId xmlns:a16="http://schemas.microsoft.com/office/drawing/2014/main" id="{4257BF44-5DB4-3A22-C11D-51A1A86EDADD}"/>
+              </a:ext>
+            </a:extLst>
+          </p:cNvPr>
+          <p:cNvSpPr>
+            <a:spLocks noGrp="1"/>
+          </p:cNvSpPr>
+          <p:nvPr>
+            <p:ph type="sldNum" sz="quarter" idx="12"/>
+          </p:nvPr>
+        </p:nvSpPr>
+        <p:spPr/>
+        <p:txBody>
+          <a:bodyPr/>
+          <a:lstStyle/>
+          <a:p>
+            <a:fld id="{20AF9D7A-5BEE-9245-944A-197F51D542D9}" type="slidenum">
+              <a:rPr lang="en-US" smtClean="0"/>
+              <a:t>4</a:t>
+            </a:fld>
+            <a:endParaRPr lang="en-US"/>
+          </a:p>
+        </p:txBody>
+      </p:sp>
+      <p:pic>
+        <p:nvPicPr>
+          <p:cNvPr id="9" name="Picture 8">
+            <a:extLst>
+              <a:ext uri="{FF2B5EF4-FFF2-40B4-BE49-F238E27FC236}">
+                <a16:creationId xmlns:a16="http://schemas.microsoft.com/office/drawing/2014/main" id="{970A9238-E342-5657-0D6A-2347970AB7FF}"/>
+              </a:ext>
+            </a:extLst>
+          </p:cNvPr>
+          <p:cNvPicPr>
+            <a:picLocks noChangeAspect="1"/>
+          </p:cNvPicPr>
+          <p:nvPr/>
+        </p:nvPicPr>
+        <p:blipFill>
+          <a:blip r:embed="rId2"/>
+          <a:stretch>
+            <a:fillRect/>
+          </a:stretch>
+        </p:blipFill>
+        <p:spPr>
+          <a:xfrm>
+            <a:off x="1676618" y="2172189"/>
+            <a:ext cx="19466999" cy="11080749"/>
+          </a:xfrm>
+          <a:prstGeom prst="rect">
+            <a:avLst/>
+          </a:prstGeom>
+        </p:spPr>
+      </p:pic>
+      <p:sp>
+        <p:nvSpPr>
+          <p:cNvPr id="10" name="TextBox 9">
+            <a:extLst>
+              <a:ext uri="{FF2B5EF4-FFF2-40B4-BE49-F238E27FC236}">
+                <a16:creationId xmlns:a16="http://schemas.microsoft.com/office/drawing/2014/main" id="{A073A345-3D08-98BC-0C8A-D150E76800F5}"/>
+              </a:ext>
+            </a:extLst>
+          </p:cNvPr>
+          <p:cNvSpPr txBox="1"/>
+          <p:nvPr/>
+        </p:nvSpPr>
+        <p:spPr>
+          <a:xfrm>
+            <a:off x="18451784" y="12978613"/>
+            <a:ext cx="6950606" cy="246221"/>
+          </a:xfrm>
+          <a:prstGeom prst="rect">
+            <a:avLst/>
+          </a:prstGeom>
+          <a:noFill/>
+        </p:spPr>
+        <p:txBody>
+          <a:bodyPr wrap="square" rtlCol="0">
+            <a:spAutoFit/>
+          </a:bodyPr>
+          <a:lstStyle/>
+          <a:p>
+            <a:r>
+              <a:rPr lang="en-US" sz="1000" dirty="0">
+                <a:latin typeface="Avenir LT Std 55 Roman"/>
+              </a:rPr>
+              <a:t>Source: Glenbrook </a:t>
+            </a:r>
+            <a:r>
+              <a:rPr lang="en-US" sz="1000" dirty="0">
+                <a:latin typeface="Avenir LT Std 55 Roman"/>
+                <a:cs typeface="Avenir LT Std 55 Roman"/>
+              </a:rPr>
+              <a:t>analysis from respective payment system data.</a:t>
+            </a:r>
+          </a:p>
+        </p:txBody>
+      </p:sp>
+    </p:spTree>
+    <p:extLst>
+      <p:ext uri="{BB962C8B-B14F-4D97-AF65-F5344CB8AC3E}">
+        <p14:creationId xmlns:p14="http://schemas.microsoft.com/office/powerpoint/2010/main" val="626140985"/>
+      </p:ext>
+    </p:extLst>
+  </p:cSld>
+  <p:clrMapOvr>
+    <a:masterClrMapping/>
+  </p:clrMapOvr>
+</p:sld>
+</file>
+
+<file path=ppt/slides/slide5.xml><?xml version="1.0" encoding="utf-8"?>
+<p:sld xmlns:a="http://schemas.openxmlformats.org/drawingml/2006/main" xmlns:r="http://schemas.openxmlformats.org/officeDocument/2006/relationships" xmlns:p="http://schemas.openxmlformats.org/presentationml/2006/main">
+  <p:cSld>
+    <p:spTree>
+      <p:nvGrpSpPr>
+        <p:cNvPr id="1" name=""/>
+        <p:cNvGrpSpPr/>
+        <p:nvPr/>
+      </p:nvGrpSpPr>
+      <p:grpSpPr>
+        <a:xfrm>
+          <a:off x="0" y="0"/>
+          <a:ext cx="0" cy="0"/>
+          <a:chOff x="0" y="0"/>
+          <a:chExt cx="0" cy="0"/>
+        </a:xfrm>
+      </p:grpSpPr>
+      <p:sp>
+        <p:nvSpPr>
+          <p:cNvPr id="2" name="Title 1">
+            <a:extLst>
+              <a:ext uri="{FF2B5EF4-FFF2-40B4-BE49-F238E27FC236}">
                 <a16:creationId xmlns:a16="http://schemas.microsoft.com/office/drawing/2014/main" id="{C4E2BEA7-D336-459D-80C5-3C6C8F7DFA3B}"/>
               </a:ext>
             </a:extLst>
@@ -4673,7 +5977,7 @@
           <a:p>
             <a:fld id="{20AF9D7A-5BEE-9245-944A-197F51D542D9}" type="slidenum">
               <a:rPr lang="en-US" smtClean="0"/>
-              <a:t>3</a:t>
+              <a:t>5</a:t>
             </a:fld>
             <a:endParaRPr lang="en-US"/>
           </a:p>
@@ -4694,14 +5998,14 @@
           <p:nvPr>
             <p:extLst>
               <p:ext uri="{D42A27DB-BD31-4B8C-83A1-F6EECF244321}">
-                <p14:modId xmlns:p14="http://schemas.microsoft.com/office/powerpoint/2010/main" val="1046322693"/>
+                <p14:modId xmlns:p14="http://schemas.microsoft.com/office/powerpoint/2010/main" val="640741177"/>
               </p:ext>
             </p:extLst>
           </p:nvPr>
         </p:nvGraphicFramePr>
         <p:xfrm>
           <a:off x="241893" y="2438400"/>
-          <a:ext cx="23253107" cy="9915527"/>
+          <a:ext cx="23253107" cy="9011478"/>
         </p:xfrm>
         <a:graphic>
           <a:graphicData uri="http://schemas.openxmlformats.org/drawingml/2006/table">
@@ -4725,7 +6029,7 @@
                   </a:extLst>
                 </a:gridCol>
               </a:tblGrid>
-              <a:tr h="3069738">
+              <a:tr h="3649809">
                 <a:tc>
                   <a:txBody>
                     <a:bodyPr/>
@@ -4988,176 +6292,7 @@
                   </a:ext>
                 </a:extLst>
               </a:tr>
-              <a:tr h="2336261">
-                <a:tc>
-                  <a:txBody>
-                    <a:bodyPr/>
-                    <a:lstStyle/>
-                    <a:p>
-                      <a:pPr marL="0" marR="0" lvl="0" indent="0" algn="l" defTabSz="914400" rtl="0" eaLnBrk="1" fontAlgn="auto" latinLnBrk="0" hangingPunct="1">
-                        <a:lnSpc>
-                          <a:spcPct val="100000"/>
-                        </a:lnSpc>
-                        <a:spcBef>
-                          <a:spcPts val="0"/>
-                        </a:spcBef>
-                        <a:spcAft>
-                          <a:spcPts val="0"/>
-                        </a:spcAft>
-                        <a:buClrTx/>
-                        <a:buSzTx/>
-                        <a:buFontTx/>
-                        <a:buNone/>
-                        <a:tabLst/>
-                        <a:defRPr/>
-                      </a:pPr>
-                      <a:r>
-                        <a:rPr lang="en-US" sz="2800" b="1" dirty="0">
-                          <a:ln>
-                            <a:noFill/>
-                          </a:ln>
-                          <a:solidFill>
-                            <a:schemeClr val="bg1"/>
-                          </a:solidFill>
-                          <a:latin typeface="+mn-lt"/>
-                        </a:rPr>
-                        <a:t>Operating &amp; Technical Guidelines</a:t>
-                      </a:r>
-                    </a:p>
-                  </a:txBody>
-                  <a:tcPr anchor="ctr">
-                    <a:lnL w="12700" cap="flat" cmpd="sng" algn="ctr">
-                      <a:noFill/>
-                      <a:prstDash val="solid"/>
-                      <a:round/>
-                      <a:headEnd type="none" w="med" len="med"/>
-                      <a:tailEnd type="none" w="med" len="med"/>
-                    </a:lnL>
-                    <a:lnR w="12700" cap="flat" cmpd="sng" algn="ctr">
-                      <a:noFill/>
-                      <a:prstDash val="solid"/>
-                      <a:round/>
-                      <a:headEnd type="none" w="med" len="med"/>
-                      <a:tailEnd type="none" w="med" len="med"/>
-                    </a:lnR>
-                    <a:lnT w="12700" cap="flat" cmpd="sng" algn="ctr">
-                      <a:noFill/>
-                      <a:prstDash val="solid"/>
-                      <a:round/>
-                      <a:headEnd type="none" w="med" len="med"/>
-                      <a:tailEnd type="none" w="med" len="med"/>
-                    </a:lnT>
-                    <a:lnB w="12700" cap="flat" cmpd="sng" algn="ctr">
-                      <a:noFill/>
-                      <a:prstDash val="solid"/>
-                      <a:round/>
-                      <a:headEnd type="none" w="med" len="med"/>
-                      <a:tailEnd type="none" w="med" len="med"/>
-                    </a:lnB>
-                    <a:lnTlToBr w="12700" cmpd="sng">
-                      <a:noFill/>
-                      <a:prstDash val="solid"/>
-                    </a:lnTlToBr>
-                    <a:lnBlToTr w="12700" cmpd="sng">
-                      <a:noFill/>
-                      <a:prstDash val="solid"/>
-                    </a:lnBlToTr>
-                    <a:solidFill>
-                      <a:schemeClr val="bg2">
-                        <a:lumMod val="25000"/>
-                      </a:schemeClr>
-                    </a:solidFill>
-                  </a:tcPr>
-                </a:tc>
-                <a:tc>
-                  <a:txBody>
-                    <a:bodyPr/>
-                    <a:lstStyle/>
-                    <a:p>
-                      <a:pPr marL="285750" indent="-285750">
-                        <a:lnSpc>
-                          <a:spcPct val="100000"/>
-                        </a:lnSpc>
-                        <a:buFont typeface="Arial" panose="020B0604020202020204" pitchFamily="34" charset="0"/>
-                        <a:buChar char="•"/>
-                      </a:pPr>
-                      <a:endParaRPr lang="en-US" sz="3200" i="0" kern="1200" dirty="0">
-                        <a:solidFill>
-                          <a:schemeClr val="tx1"/>
-                        </a:solidFill>
-                        <a:latin typeface="+mn-lt"/>
-                        <a:ea typeface="+mn-ea"/>
-                        <a:cs typeface="+mn-cs"/>
-                      </a:endParaRPr>
-                    </a:p>
-                    <a:p>
-                      <a:pPr marL="285750" indent="-165100">
-                        <a:lnSpc>
-                          <a:spcPct val="100000"/>
-                        </a:lnSpc>
-                        <a:buFont typeface="Arial" panose="020B0604020202020204" pitchFamily="34" charset="0"/>
-                        <a:buChar char="•"/>
-                        <a:tabLst/>
-                      </a:pPr>
-                      <a:r>
-                        <a:rPr lang="en-US" sz="3200" i="0" kern="1200" dirty="0">
-                          <a:solidFill>
-                            <a:schemeClr val="tx1"/>
-                          </a:solidFill>
-                          <a:latin typeface="+mn-lt"/>
-                          <a:ea typeface="+mn-ea"/>
-                          <a:cs typeface="+mn-cs"/>
-                        </a:rPr>
-                        <a:t>The Operating and Technical Guidelines is a that provides the operational, technical, and functional details that participants and non-participant entities need to implement and observe within the Scheme</a:t>
-                      </a:r>
-                    </a:p>
-                  </a:txBody>
-                  <a:tcPr>
-                    <a:lnL w="12700" cap="flat" cmpd="sng" algn="ctr">
-                      <a:noFill/>
-                      <a:prstDash val="solid"/>
-                      <a:round/>
-                      <a:headEnd type="none" w="med" len="med"/>
-                      <a:tailEnd type="none" w="med" len="med"/>
-                    </a:lnL>
-                    <a:lnR w="12700" cap="flat" cmpd="sng" algn="ctr">
-                      <a:noFill/>
-                      <a:prstDash val="solid"/>
-                      <a:round/>
-                      <a:headEnd type="none" w="med" len="med"/>
-                      <a:tailEnd type="none" w="med" len="med"/>
-                    </a:lnR>
-                    <a:lnT w="12700" cap="flat" cmpd="sng" algn="ctr">
-                      <a:noFill/>
-                      <a:prstDash val="solid"/>
-                      <a:round/>
-                      <a:headEnd type="none" w="med" len="med"/>
-                      <a:tailEnd type="none" w="med" len="med"/>
-                    </a:lnT>
-                    <a:lnB w="12700" cap="flat" cmpd="sng" algn="ctr">
-                      <a:noFill/>
-                      <a:prstDash val="solid"/>
-                      <a:round/>
-                      <a:headEnd type="none" w="med" len="med"/>
-                      <a:tailEnd type="none" w="med" len="med"/>
-                    </a:lnB>
-                    <a:lnTlToBr w="12700" cmpd="sng">
-                      <a:noFill/>
-                      <a:prstDash val="solid"/>
-                    </a:lnTlToBr>
-                    <a:lnBlToTr w="12700" cmpd="sng">
-                      <a:noFill/>
-                      <a:prstDash val="solid"/>
-                    </a:lnBlToTr>
-                  </a:tcPr>
-                </a:tc>
-                <a:extLst>
-                  <a:ext uri="{0D108BD9-81ED-4DB2-BD59-A6C34878D82A}">
-                    <a16:rowId xmlns:a16="http://schemas.microsoft.com/office/drawing/2014/main" val="1246879397"/>
-                  </a:ext>
-                </a:extLst>
-              </a:tr>
-              <a:tr h="4509528">
+              <a:tr h="5361669">
                 <a:tc>
                   <a:txBody>
                     <a:bodyPr/>
@@ -5593,7 +6728,7 @@
 </p:sld>
 </file>
 
-<file path=ppt/slides/slide4.xml><?xml version="1.0" encoding="utf-8"?>
+<file path=ppt/slides/slide6.xml><?xml version="1.0" encoding="utf-8"?>
 <p:sld xmlns:a="http://schemas.openxmlformats.org/drawingml/2006/main" xmlns:r="http://schemas.openxmlformats.org/officeDocument/2006/relationships" xmlns:p="http://schemas.openxmlformats.org/presentationml/2006/main">
   <p:cSld>
     <p:spTree>
@@ -6070,7 +7205,7 @@
           <a:p>
             <a:fld id="{20AF9D7A-5BEE-9245-944A-197F51D542D9}" type="slidenum">
               <a:rPr lang="en-US" smtClean="0"/>
-              <a:t>4</a:t>
+              <a:t>6</a:t>
             </a:fld>
             <a:endParaRPr lang="en-US"/>
           </a:p>
@@ -6444,7 +7579,7 @@
 </p:sld>
 </file>
 
-<file path=ppt/slides/slide5.xml><?xml version="1.0" encoding="utf-8"?>
+<file path=ppt/slides/slide7.xml><?xml version="1.0" encoding="utf-8"?>
 <p:sld xmlns:a="http://schemas.openxmlformats.org/drawingml/2006/main" xmlns:r="http://schemas.openxmlformats.org/officeDocument/2006/relationships" xmlns:p="http://schemas.openxmlformats.org/presentationml/2006/main">
   <p:cSld>
     <p:spTree>
@@ -6729,7 +7864,7 @@
           <a:p>
             <a:fld id="{20AF9D7A-5BEE-9245-944A-197F51D542D9}" type="slidenum">
               <a:rPr lang="en-US" smtClean="0"/>
-              <a:t>5</a:t>
+              <a:t>7</a:t>
             </a:fld>
             <a:endParaRPr lang="en-US"/>
           </a:p>
@@ -6911,7 +8046,7 @@
 </p:sld>
 </file>
 
-<file path=ppt/slides/slide6.xml><?xml version="1.0" encoding="utf-8"?>
+<file path=ppt/slides/slide8.xml><?xml version="1.0" encoding="utf-8"?>
 <p:sld xmlns:a="http://schemas.openxmlformats.org/drawingml/2006/main" xmlns:r="http://schemas.openxmlformats.org/officeDocument/2006/relationships" xmlns:p="http://schemas.openxmlformats.org/presentationml/2006/main">
   <p:cSld>
     <p:spTree>
@@ -7324,7 +8459,7 @@
           <a:p>
             <a:fld id="{20AF9D7A-5BEE-9245-944A-197F51D542D9}" type="slidenum">
               <a:rPr lang="en-US" smtClean="0"/>
-              <a:t>6</a:t>
+              <a:t>8</a:t>
             </a:fld>
             <a:endParaRPr lang="en-US"/>
           </a:p>
@@ -7343,7 +8478,7 @@
 </p:sld>
 </file>
 
-<file path=ppt/slides/slide7.xml><?xml version="1.0" encoding="utf-8"?>
+<file path=ppt/slides/slide9.xml><?xml version="1.0" encoding="utf-8"?>
 <p:sld xmlns:a="http://schemas.openxmlformats.org/drawingml/2006/main" xmlns:r="http://schemas.openxmlformats.org/officeDocument/2006/relationships" xmlns:p="http://schemas.openxmlformats.org/presentationml/2006/main">
   <p:cSld>
     <p:spTree>
@@ -7413,7 +8548,7 @@
           <a:p>
             <a:fld id="{20AF9D7A-5BEE-9245-944A-197F51D542D9}" type="slidenum">
               <a:rPr lang="en-US" smtClean="0"/>
-              <a:t>7</a:t>
+              <a:t>9</a:t>
             </a:fld>
             <a:endParaRPr lang="en-US"/>
           </a:p>
@@ -7888,1001 +9023,6 @@
     <p:extLst>
       <p:ext uri="{BB962C8B-B14F-4D97-AF65-F5344CB8AC3E}">
         <p14:creationId xmlns:p14="http://schemas.microsoft.com/office/powerpoint/2010/main" val="1055967005"/>
-      </p:ext>
-    </p:extLst>
-  </p:cSld>
-  <p:clrMapOvr>
-    <a:masterClrMapping/>
-  </p:clrMapOvr>
-</p:sld>
-</file>
-
-<file path=ppt/slides/slide8.xml><?xml version="1.0" encoding="utf-8"?>
-<p:sld xmlns:a="http://schemas.openxmlformats.org/drawingml/2006/main" xmlns:r="http://schemas.openxmlformats.org/officeDocument/2006/relationships" xmlns:p="http://schemas.openxmlformats.org/presentationml/2006/main">
-  <p:cSld>
-    <p:spTree>
-      <p:nvGrpSpPr>
-        <p:cNvPr id="1" name=""/>
-        <p:cNvGrpSpPr/>
-        <p:nvPr/>
-      </p:nvGrpSpPr>
-      <p:grpSpPr>
-        <a:xfrm>
-          <a:off x="0" y="0"/>
-          <a:ext cx="0" cy="0"/>
-          <a:chOff x="0" y="0"/>
-          <a:chExt cx="0" cy="0"/>
-        </a:xfrm>
-      </p:grpSpPr>
-      <p:sp>
-        <p:nvSpPr>
-          <p:cNvPr id="2" name="Title 1">
-            <a:extLst>
-              <a:ext uri="{FF2B5EF4-FFF2-40B4-BE49-F238E27FC236}">
-                <a16:creationId xmlns:a16="http://schemas.microsoft.com/office/drawing/2014/main" id="{C826B357-687D-21E7-A1C2-8651CF064282}"/>
-              </a:ext>
-            </a:extLst>
-          </p:cNvPr>
-          <p:cNvSpPr>
-            <a:spLocks noGrp="1"/>
-          </p:cNvSpPr>
-          <p:nvPr>
-            <p:ph type="title"/>
-          </p:nvPr>
-        </p:nvSpPr>
-        <p:spPr/>
-        <p:txBody>
-          <a:bodyPr>
-            <a:noAutofit/>
-          </a:bodyPr>
-          <a:lstStyle/>
-          <a:p>
-            <a:r>
-              <a:rPr lang="en-US" sz="6600" dirty="0"/>
-              <a:t>Let’s Walk Through an Example: Entity Responsibilities </a:t>
-            </a:r>
-          </a:p>
-        </p:txBody>
-      </p:sp>
-      <p:sp>
-        <p:nvSpPr>
-          <p:cNvPr id="3" name="Content Placeholder 2">
-            <a:extLst>
-              <a:ext uri="{FF2B5EF4-FFF2-40B4-BE49-F238E27FC236}">
-                <a16:creationId xmlns:a16="http://schemas.microsoft.com/office/drawing/2014/main" id="{EDD7BD75-478F-9798-388A-51AA2EF89880}"/>
-              </a:ext>
-            </a:extLst>
-          </p:cNvPr>
-          <p:cNvSpPr>
-            <a:spLocks noGrp="1"/>
-          </p:cNvSpPr>
-          <p:nvPr>
-            <p:ph idx="1"/>
-          </p:nvPr>
-        </p:nvSpPr>
-        <p:spPr/>
-        <p:txBody>
-          <a:bodyPr>
-            <a:noAutofit/>
-          </a:bodyPr>
-          <a:lstStyle/>
-          <a:p>
-            <a:pPr marL="0">
-              <a:lnSpc>
-                <a:spcPct val="150000"/>
-              </a:lnSpc>
-              <a:spcBef>
-                <a:spcPts val="0"/>
-              </a:spcBef>
-              <a:buNone/>
-            </a:pPr>
-            <a:r>
-              <a:rPr lang="en-US" sz="2000" b="1" dirty="0">
-                <a:solidFill>
-                  <a:srgbClr val="000000"/>
-                </a:solidFill>
-                <a:effectLst/>
-                <a:ea typeface="Calibri" panose="020F0502020204030204" pitchFamily="34" charset="0"/>
-                <a:cs typeface="Calibri" panose="020F0502020204030204" pitchFamily="34" charset="0"/>
-              </a:rPr>
-              <a:t>Participants Responsibilities</a:t>
-            </a:r>
-            <a:endParaRPr lang="en-US" sz="2000" dirty="0">
-              <a:effectLst/>
-              <a:ea typeface="Calibri" panose="020F0502020204030204" pitchFamily="34" charset="0"/>
-              <a:cs typeface="Times New Roman" panose="02020603050405020304" pitchFamily="18" charset="0"/>
-            </a:endParaRPr>
-          </a:p>
-          <a:p>
-            <a:pPr marL="1200150" lvl="2" indent="-285750">
-              <a:lnSpc>
-                <a:spcPct val="150000"/>
-              </a:lnSpc>
-              <a:spcBef>
-                <a:spcPts val="0"/>
-              </a:spcBef>
-              <a:buSzPts val="1200"/>
-            </a:pPr>
-            <a:r>
-              <a:rPr lang="en-US" sz="2000" dirty="0">
-                <a:solidFill>
-                  <a:srgbClr val="000000"/>
-                </a:solidFill>
-                <a:effectLst/>
-                <a:ea typeface="Calibri" panose="020F0502020204030204" pitchFamily="34" charset="0"/>
-                <a:cs typeface="Calibri" panose="020F0502020204030204" pitchFamily="34" charset="0"/>
-              </a:rPr>
-              <a:t>A Participant must be licensed to by </a:t>
-            </a:r>
-            <a:r>
-              <a:rPr lang="en-US" sz="2000" dirty="0">
-                <a:solidFill>
-                  <a:srgbClr val="C00000"/>
-                </a:solidFill>
-                <a:effectLst/>
-                <a:ea typeface="Calibri" panose="020F0502020204030204" pitchFamily="34" charset="0"/>
-                <a:cs typeface="Calibri" panose="020F0502020204030204" pitchFamily="34" charset="0"/>
-              </a:rPr>
-              <a:t>&lt;insert relevant regulatory agency&gt;.</a:t>
-            </a:r>
-            <a:endParaRPr lang="en-US" sz="2000" dirty="0">
-              <a:effectLst/>
-              <a:ea typeface="Calibri" panose="020F0502020204030204" pitchFamily="34" charset="0"/>
-              <a:cs typeface="Times New Roman" panose="02020603050405020304" pitchFamily="18" charset="0"/>
-            </a:endParaRPr>
-          </a:p>
-          <a:p>
-            <a:pPr marL="1200150" lvl="2" indent="-285750">
-              <a:lnSpc>
-                <a:spcPct val="150000"/>
-              </a:lnSpc>
-              <a:spcBef>
-                <a:spcPts val="0"/>
-              </a:spcBef>
-              <a:buSzPts val="1200"/>
-            </a:pPr>
-            <a:r>
-              <a:rPr lang="en-US" sz="2000" dirty="0">
-                <a:solidFill>
-                  <a:srgbClr val="000000"/>
-                </a:solidFill>
-                <a:effectLst/>
-                <a:ea typeface="Calibri" panose="020F0502020204030204" pitchFamily="34" charset="0"/>
-                <a:cs typeface="Calibri" panose="020F0502020204030204" pitchFamily="34" charset="0"/>
-              </a:rPr>
-              <a:t>A Participant can play the role of Sending Participant and as a Receiving Participant.</a:t>
-            </a:r>
-            <a:endParaRPr lang="en-US" sz="2000" dirty="0">
-              <a:effectLst/>
-              <a:ea typeface="Calibri" panose="020F0502020204030204" pitchFamily="34" charset="0"/>
-              <a:cs typeface="Times New Roman" panose="02020603050405020304" pitchFamily="18" charset="0"/>
-            </a:endParaRPr>
-          </a:p>
-          <a:p>
-            <a:pPr marL="1200150" lvl="2" indent="-285750">
-              <a:lnSpc>
-                <a:spcPct val="150000"/>
-              </a:lnSpc>
-              <a:spcBef>
-                <a:spcPts val="0"/>
-              </a:spcBef>
-              <a:buSzPts val="1200"/>
-            </a:pPr>
-            <a:r>
-              <a:rPr lang="en-US" sz="2000" dirty="0">
-                <a:solidFill>
-                  <a:srgbClr val="000000"/>
-                </a:solidFill>
-                <a:effectLst/>
-                <a:ea typeface="Calibri" panose="020F0502020204030204" pitchFamily="34" charset="0"/>
-                <a:cs typeface="Calibri" panose="020F0502020204030204" pitchFamily="34" charset="0"/>
-              </a:rPr>
-              <a:t>A Participant must connect to the Payment Hub to perform its roles and responsibilities.</a:t>
-            </a:r>
-            <a:endParaRPr lang="en-US" sz="2000" dirty="0">
-              <a:effectLst/>
-              <a:ea typeface="Calibri" panose="020F0502020204030204" pitchFamily="34" charset="0"/>
-              <a:cs typeface="Times New Roman" panose="02020603050405020304" pitchFamily="18" charset="0"/>
-            </a:endParaRPr>
-          </a:p>
-          <a:p>
-            <a:pPr marL="1200150" lvl="2" indent="-285750">
-              <a:lnSpc>
-                <a:spcPct val="150000"/>
-              </a:lnSpc>
-              <a:spcBef>
-                <a:spcPts val="0"/>
-              </a:spcBef>
-              <a:buSzPts val="1200"/>
-            </a:pPr>
-            <a:r>
-              <a:rPr lang="en-US" sz="2000" dirty="0">
-                <a:solidFill>
-                  <a:srgbClr val="000000"/>
-                </a:solidFill>
-                <a:effectLst/>
-                <a:ea typeface="Calibri" panose="020F0502020204030204" pitchFamily="34" charset="0"/>
-                <a:cs typeface="Calibri" panose="020F0502020204030204" pitchFamily="34" charset="0"/>
-              </a:rPr>
-              <a:t>A Participant must be able to initiate and </a:t>
-            </a:r>
-            <a:r>
-              <a:rPr lang="en-US" sz="2000" dirty="0">
-                <a:effectLst/>
-                <a:ea typeface="Calibri" panose="020F0502020204030204" pitchFamily="34" charset="0"/>
-                <a:cs typeface="Calibri" panose="020F0502020204030204" pitchFamily="34" charset="0"/>
-              </a:rPr>
-              <a:t>receive all Value and Non-Value Messages in support of the Funds Transfer flows relevant to its role as Direct or Indirect Participant. </a:t>
-            </a:r>
-            <a:endParaRPr lang="en-US" sz="2000" dirty="0">
-              <a:effectLst/>
-              <a:ea typeface="Calibri" panose="020F0502020204030204" pitchFamily="34" charset="0"/>
-              <a:cs typeface="Times New Roman" panose="02020603050405020304" pitchFamily="18" charset="0"/>
-            </a:endParaRPr>
-          </a:p>
-          <a:p>
-            <a:pPr marL="1200150" lvl="2" indent="-285750">
-              <a:lnSpc>
-                <a:spcPct val="150000"/>
-              </a:lnSpc>
-              <a:spcBef>
-                <a:spcPts val="0"/>
-              </a:spcBef>
-              <a:buSzPts val="1200"/>
-            </a:pPr>
-            <a:r>
-              <a:rPr lang="en-US" sz="2000" dirty="0">
-                <a:effectLst/>
-                <a:ea typeface="Calibri" panose="020F0502020204030204" pitchFamily="34" charset="0"/>
-                <a:cs typeface="Calibri" panose="020F0502020204030204" pitchFamily="34" charset="0"/>
-              </a:rPr>
-              <a:t>A Participant must support the Channels outlined in this Rulebook.</a:t>
-            </a:r>
-            <a:endParaRPr lang="en-US" sz="2000" dirty="0">
-              <a:effectLst/>
-              <a:ea typeface="Calibri" panose="020F0502020204030204" pitchFamily="34" charset="0"/>
-              <a:cs typeface="Times New Roman" panose="02020603050405020304" pitchFamily="18" charset="0"/>
-            </a:endParaRPr>
-          </a:p>
-          <a:p>
-            <a:pPr marL="1200150" lvl="2" indent="-285750">
-              <a:lnSpc>
-                <a:spcPct val="150000"/>
-              </a:lnSpc>
-              <a:spcBef>
-                <a:spcPts val="0"/>
-              </a:spcBef>
-              <a:buSzPts val="1200"/>
-            </a:pPr>
-            <a:r>
-              <a:rPr lang="en-US" sz="2000" dirty="0">
-                <a:effectLst/>
-                <a:ea typeface="Calibri" panose="020F0502020204030204" pitchFamily="34" charset="0"/>
-                <a:cs typeface="Times New Roman" panose="02020603050405020304" pitchFamily="18" charset="0"/>
-              </a:rPr>
-              <a:t>A Participant must be able to access the Participant Portal.</a:t>
-            </a:r>
-          </a:p>
-          <a:p>
-            <a:pPr marL="1200150" lvl="2" indent="-285750">
-              <a:lnSpc>
-                <a:spcPct val="150000"/>
-              </a:lnSpc>
-              <a:spcBef>
-                <a:spcPts val="0"/>
-              </a:spcBef>
-              <a:buSzPts val="1200"/>
-            </a:pPr>
-            <a:r>
-              <a:rPr lang="en-US" sz="2000" dirty="0">
-                <a:effectLst/>
-                <a:ea typeface="Calibri" panose="020F0502020204030204" pitchFamily="34" charset="0"/>
-                <a:cs typeface="Calibri" panose="020F0502020204030204" pitchFamily="34" charset="0"/>
-              </a:rPr>
-              <a:t>A Participant must have sufficient and appropriate staff to perform its roles and responsibilities in accordance with the Rulebook.</a:t>
-            </a:r>
-            <a:endParaRPr lang="en-US" sz="2000" dirty="0">
-              <a:effectLst/>
-              <a:ea typeface="Calibri" panose="020F0502020204030204" pitchFamily="34" charset="0"/>
-              <a:cs typeface="Times New Roman" panose="02020603050405020304" pitchFamily="18" charset="0"/>
-            </a:endParaRPr>
-          </a:p>
-          <a:p>
-            <a:pPr marL="1200150" lvl="2" indent="-285750">
-              <a:lnSpc>
-                <a:spcPct val="150000"/>
-              </a:lnSpc>
-              <a:spcBef>
-                <a:spcPts val="0"/>
-              </a:spcBef>
-              <a:buSzPts val="1200"/>
-            </a:pPr>
-            <a:r>
-              <a:rPr lang="en-US" sz="2000" dirty="0">
-                <a:effectLst/>
-                <a:ea typeface="Calibri" panose="020F0502020204030204" pitchFamily="34" charset="0"/>
-                <a:cs typeface="Times New Roman" panose="02020603050405020304" pitchFamily="18" charset="0"/>
-              </a:rPr>
-              <a:t>A Participant must pay all relevant Fees according to the terms outlined in this Rulebook.   </a:t>
-            </a:r>
-          </a:p>
-          <a:p>
-            <a:pPr marL="1200150" lvl="2" indent="-285750">
-              <a:lnSpc>
-                <a:spcPct val="150000"/>
-              </a:lnSpc>
-              <a:spcBef>
-                <a:spcPts val="0"/>
-              </a:spcBef>
-              <a:buSzPts val="1200"/>
-            </a:pPr>
-            <a:r>
-              <a:rPr lang="en-US" sz="2000" dirty="0">
-                <a:effectLst/>
-                <a:ea typeface="Calibri" panose="020F0502020204030204" pitchFamily="34" charset="0"/>
-                <a:cs typeface="Times New Roman" panose="02020603050405020304" pitchFamily="18" charset="0"/>
-              </a:rPr>
-              <a:t>A Participant must sign a Participation Agreement and any other relevant Agreement required to perform specific roles.  </a:t>
-            </a:r>
-          </a:p>
-          <a:p>
-            <a:pPr marL="1200150" lvl="2" indent="-285750">
-              <a:lnSpc>
-                <a:spcPct val="150000"/>
-              </a:lnSpc>
-              <a:spcBef>
-                <a:spcPts val="0"/>
-              </a:spcBef>
-              <a:buSzPts val="1200"/>
-            </a:pPr>
-            <a:endParaRPr lang="en-US" sz="2000" dirty="0">
-              <a:effectLst/>
-              <a:ea typeface="Calibri" panose="020F0502020204030204" pitchFamily="34" charset="0"/>
-              <a:cs typeface="Times New Roman" panose="02020603050405020304" pitchFamily="18" charset="0"/>
-            </a:endParaRPr>
-          </a:p>
-          <a:p>
-            <a:pPr marL="0" lvl="1" indent="0">
-              <a:lnSpc>
-                <a:spcPct val="150000"/>
-              </a:lnSpc>
-              <a:spcBef>
-                <a:spcPts val="0"/>
-              </a:spcBef>
-              <a:buSzPts val="1200"/>
-              <a:buNone/>
-            </a:pPr>
-            <a:r>
-              <a:rPr lang="en-US" sz="2000" b="1" dirty="0">
-                <a:solidFill>
-                  <a:srgbClr val="000000"/>
-                </a:solidFill>
-                <a:effectLst/>
-                <a:ea typeface="Calibri" panose="020F0502020204030204" pitchFamily="34" charset="0"/>
-                <a:cs typeface="Calibri" panose="020F0502020204030204" pitchFamily="34" charset="0"/>
-              </a:rPr>
-              <a:t>The Scheme defines two types of Participants. Additional roles and responsibilities apply to each Participant type:</a:t>
-            </a:r>
-            <a:endParaRPr lang="en-US" sz="2000" b="1" dirty="0">
-              <a:effectLst/>
-              <a:ea typeface="Calibri" panose="020F0502020204030204" pitchFamily="34" charset="0"/>
-              <a:cs typeface="Times New Roman" panose="02020603050405020304" pitchFamily="18" charset="0"/>
-            </a:endParaRPr>
-          </a:p>
-          <a:p>
-            <a:pPr marL="1657350" lvl="3" indent="-285750">
-              <a:lnSpc>
-                <a:spcPct val="150000"/>
-              </a:lnSpc>
-              <a:spcBef>
-                <a:spcPts val="0"/>
-              </a:spcBef>
-            </a:pPr>
-            <a:r>
-              <a:rPr lang="en-US" sz="2000" b="1" dirty="0">
-                <a:solidFill>
-                  <a:srgbClr val="000000"/>
-                </a:solidFill>
-                <a:effectLst/>
-                <a:ea typeface="Calibri" panose="020F0502020204030204" pitchFamily="34" charset="0"/>
-                <a:cs typeface="Calibri" panose="020F0502020204030204" pitchFamily="34" charset="0"/>
-              </a:rPr>
-              <a:t>Direct Participant.</a:t>
-            </a:r>
-            <a:r>
-              <a:rPr lang="en-US" sz="2000" dirty="0">
-                <a:solidFill>
-                  <a:srgbClr val="000000"/>
-                </a:solidFill>
-                <a:effectLst/>
-                <a:ea typeface="Calibri" panose="020F0502020204030204" pitchFamily="34" charset="0"/>
-                <a:cs typeface="Calibri" panose="020F0502020204030204" pitchFamily="34" charset="0"/>
-              </a:rPr>
-              <a:t> A Participant that is authorized to have a direct Settlement Account with the Settlement Bank. </a:t>
-            </a:r>
-            <a:endParaRPr lang="en-US" sz="2000" dirty="0">
-              <a:effectLst/>
-              <a:ea typeface="Calibri" panose="020F0502020204030204" pitchFamily="34" charset="0"/>
-              <a:cs typeface="Times New Roman" panose="02020603050405020304" pitchFamily="18" charset="0"/>
-            </a:endParaRPr>
-          </a:p>
-          <a:p>
-            <a:pPr marL="2114550" lvl="4" indent="-285750">
-              <a:lnSpc>
-                <a:spcPct val="150000"/>
-              </a:lnSpc>
-              <a:spcBef>
-                <a:spcPts val="0"/>
-              </a:spcBef>
-            </a:pPr>
-            <a:r>
-              <a:rPr lang="en-US" sz="2000" dirty="0">
-                <a:solidFill>
-                  <a:srgbClr val="000000"/>
-                </a:solidFill>
-                <a:effectLst/>
-                <a:ea typeface="Calibri" panose="020F0502020204030204" pitchFamily="34" charset="0"/>
-                <a:cs typeface="Calibri" panose="020F0502020204030204" pitchFamily="34" charset="0"/>
-              </a:rPr>
-              <a:t>A Direct Participant must be able to exchange messages with the Settlement Bank to execute Settlement. </a:t>
-            </a:r>
-            <a:endParaRPr lang="en-US" sz="2000" dirty="0">
-              <a:effectLst/>
-              <a:ea typeface="Calibri" panose="020F0502020204030204" pitchFamily="34" charset="0"/>
-              <a:cs typeface="Times New Roman" panose="02020603050405020304" pitchFamily="18" charset="0"/>
-            </a:endParaRPr>
-          </a:p>
-          <a:p>
-            <a:pPr marL="2114550" lvl="4" indent="-285750">
-              <a:lnSpc>
-                <a:spcPct val="150000"/>
-              </a:lnSpc>
-              <a:spcBef>
-                <a:spcPts val="0"/>
-              </a:spcBef>
-            </a:pPr>
-            <a:r>
-              <a:rPr lang="en-US" sz="2000" dirty="0">
-                <a:solidFill>
-                  <a:srgbClr val="000000"/>
-                </a:solidFill>
-                <a:effectLst/>
-                <a:ea typeface="Calibri" panose="020F0502020204030204" pitchFamily="34" charset="0"/>
-                <a:cs typeface="Calibri" panose="020F0502020204030204" pitchFamily="34" charset="0"/>
-              </a:rPr>
-              <a:t>A Direct Participant may serve as a Settlement Sponsor to an Indirect Participant.</a:t>
-            </a:r>
-            <a:endParaRPr lang="en-US" sz="2000" dirty="0">
-              <a:effectLst/>
-              <a:ea typeface="Calibri" panose="020F0502020204030204" pitchFamily="34" charset="0"/>
-              <a:cs typeface="Times New Roman" panose="02020603050405020304" pitchFamily="18" charset="0"/>
-            </a:endParaRPr>
-          </a:p>
-          <a:p>
-            <a:pPr marL="2114550" lvl="4" indent="-285750">
-              <a:lnSpc>
-                <a:spcPct val="150000"/>
-              </a:lnSpc>
-              <a:spcBef>
-                <a:spcPts val="0"/>
-              </a:spcBef>
-            </a:pPr>
-            <a:r>
-              <a:rPr lang="en-US" sz="2000" dirty="0">
-                <a:solidFill>
-                  <a:srgbClr val="000000"/>
-                </a:solidFill>
-                <a:effectLst/>
-                <a:ea typeface="Calibri" panose="020F0502020204030204" pitchFamily="34" charset="0"/>
-                <a:cs typeface="Calibri" panose="020F0502020204030204" pitchFamily="34" charset="0"/>
-              </a:rPr>
-              <a:t>A Direct Participant that serves as a Settlement Sponsor to an Indirect Participant must register each Indirect Participant it Sponsors (Sponsored Participant) with the Scheme.</a:t>
-            </a:r>
-            <a:endParaRPr lang="en-US" sz="2000" dirty="0">
-              <a:effectLst/>
-              <a:ea typeface="Calibri" panose="020F0502020204030204" pitchFamily="34" charset="0"/>
-              <a:cs typeface="Times New Roman" panose="02020603050405020304" pitchFamily="18" charset="0"/>
-            </a:endParaRPr>
-          </a:p>
-          <a:p>
-            <a:pPr marL="1657350" lvl="3" indent="-285750">
-              <a:lnSpc>
-                <a:spcPct val="150000"/>
-              </a:lnSpc>
-              <a:spcBef>
-                <a:spcPts val="0"/>
-              </a:spcBef>
-            </a:pPr>
-            <a:r>
-              <a:rPr lang="en-US" sz="2000" b="1" dirty="0">
-                <a:solidFill>
-                  <a:srgbClr val="000000"/>
-                </a:solidFill>
-                <a:effectLst/>
-                <a:ea typeface="Calibri" panose="020F0502020204030204" pitchFamily="34" charset="0"/>
-                <a:cs typeface="Calibri" panose="020F0502020204030204" pitchFamily="34" charset="0"/>
-              </a:rPr>
-              <a:t>Indirect Participant.</a:t>
-            </a:r>
-            <a:r>
-              <a:rPr lang="en-US" sz="2000" dirty="0">
-                <a:solidFill>
-                  <a:srgbClr val="000000"/>
-                </a:solidFill>
-                <a:effectLst/>
-                <a:ea typeface="Calibri" panose="020F0502020204030204" pitchFamily="34" charset="0"/>
-                <a:cs typeface="Calibri" panose="020F0502020204030204" pitchFamily="34" charset="0"/>
-              </a:rPr>
-              <a:t> </a:t>
-            </a:r>
-            <a:r>
-              <a:rPr lang="en-US" sz="2000" dirty="0">
-                <a:solidFill>
-                  <a:srgbClr val="000000"/>
-                </a:solidFill>
-                <a:effectLst/>
-                <a:ea typeface="Calibri" panose="020F0502020204030204" pitchFamily="34" charset="0"/>
-                <a:cs typeface="Times New Roman" panose="02020603050405020304" pitchFamily="18" charset="0"/>
-              </a:rPr>
-              <a:t> </a:t>
-            </a:r>
-            <a:r>
-              <a:rPr lang="en-US" sz="2000" dirty="0">
-                <a:effectLst/>
-                <a:ea typeface="Calibri" panose="020F0502020204030204" pitchFamily="34" charset="0"/>
-                <a:cs typeface="Times New Roman" panose="02020603050405020304" pitchFamily="18" charset="0"/>
-              </a:rPr>
-              <a:t> </a:t>
-            </a:r>
-            <a:r>
-              <a:rPr lang="en-US" sz="2000" dirty="0">
-                <a:solidFill>
-                  <a:srgbClr val="000000"/>
-                </a:solidFill>
-                <a:effectLst/>
-                <a:ea typeface="Calibri" panose="020F0502020204030204" pitchFamily="34" charset="0"/>
-                <a:cs typeface="Calibri" panose="020F0502020204030204" pitchFamily="34" charset="0"/>
-              </a:rPr>
-              <a:t>A Participant that is not authorized to have a direct Settlement Account with the Settlement Bank. An Indirect Participant must rely on a Direct Participant for Settlement.</a:t>
-            </a:r>
-            <a:endParaRPr lang="en-US" sz="2000" dirty="0">
-              <a:effectLst/>
-              <a:ea typeface="Calibri" panose="020F0502020204030204" pitchFamily="34" charset="0"/>
-              <a:cs typeface="Times New Roman" panose="02020603050405020304" pitchFamily="18" charset="0"/>
-            </a:endParaRPr>
-          </a:p>
-          <a:p>
-            <a:pPr marL="2114550" lvl="4" indent="-285750">
-              <a:lnSpc>
-                <a:spcPct val="150000"/>
-              </a:lnSpc>
-              <a:spcBef>
-                <a:spcPts val="0"/>
-              </a:spcBef>
-            </a:pPr>
-            <a:r>
-              <a:rPr lang="en-US" sz="2000" dirty="0">
-                <a:solidFill>
-                  <a:srgbClr val="000000"/>
-                </a:solidFill>
-                <a:effectLst/>
-                <a:ea typeface="Calibri" panose="020F0502020204030204" pitchFamily="34" charset="0"/>
-                <a:cs typeface="Calibri" panose="020F0502020204030204" pitchFamily="34" charset="0"/>
-              </a:rPr>
-              <a:t>An Indirect Participant must use a Direct Participant to serve as its Settlement Sponsor.</a:t>
-            </a:r>
-            <a:endParaRPr lang="en-US" sz="2000" dirty="0">
-              <a:effectLst/>
-              <a:ea typeface="Calibri" panose="020F0502020204030204" pitchFamily="34" charset="0"/>
-              <a:cs typeface="Times New Roman" panose="02020603050405020304" pitchFamily="18" charset="0"/>
-            </a:endParaRPr>
-          </a:p>
-          <a:p>
-            <a:pPr marL="2114550" lvl="4" indent="-285750">
-              <a:lnSpc>
-                <a:spcPct val="150000"/>
-              </a:lnSpc>
-              <a:spcBef>
-                <a:spcPts val="0"/>
-              </a:spcBef>
-            </a:pPr>
-            <a:r>
-              <a:rPr lang="en-US" sz="2000" dirty="0">
-                <a:solidFill>
-                  <a:srgbClr val="000000"/>
-                </a:solidFill>
-                <a:effectLst/>
-                <a:ea typeface="Calibri" panose="020F0502020204030204" pitchFamily="34" charset="0"/>
-                <a:cs typeface="Calibri" panose="020F0502020204030204" pitchFamily="34" charset="0"/>
-              </a:rPr>
-              <a:t>An Indirect Participant must be able to exchange messages with the Direct Participant to execute Settlement.</a:t>
-            </a:r>
-            <a:endParaRPr lang="en-US" sz="2000" dirty="0">
-              <a:effectLst/>
-              <a:ea typeface="Calibri" panose="020F0502020204030204" pitchFamily="34" charset="0"/>
-              <a:cs typeface="Times New Roman" panose="02020603050405020304" pitchFamily="18" charset="0"/>
-            </a:endParaRPr>
-          </a:p>
-          <a:p>
-            <a:pPr marL="2114550" lvl="4" indent="-285750">
-              <a:lnSpc>
-                <a:spcPct val="150000"/>
-              </a:lnSpc>
-              <a:spcBef>
-                <a:spcPts val="0"/>
-              </a:spcBef>
-            </a:pPr>
-            <a:r>
-              <a:rPr lang="en-US" sz="2000" dirty="0">
-                <a:solidFill>
-                  <a:srgbClr val="000000"/>
-                </a:solidFill>
-                <a:effectLst/>
-                <a:ea typeface="Calibri" panose="020F0502020204030204" pitchFamily="34" charset="0"/>
-                <a:cs typeface="Calibri" panose="020F0502020204030204" pitchFamily="34" charset="0"/>
-              </a:rPr>
-              <a:t>An Indirect Participant must be registered with the Scheme as a Sponsored Participant.  </a:t>
-            </a:r>
-            <a:endParaRPr lang="en-US" sz="2000" dirty="0">
-              <a:effectLst/>
-              <a:ea typeface="Calibri" panose="020F0502020204030204" pitchFamily="34" charset="0"/>
-              <a:cs typeface="Times New Roman" panose="02020603050405020304" pitchFamily="18" charset="0"/>
-            </a:endParaRPr>
-          </a:p>
-        </p:txBody>
-      </p:sp>
-      <p:sp>
-        <p:nvSpPr>
-          <p:cNvPr id="4" name="Slide Number Placeholder 3">
-            <a:extLst>
-              <a:ext uri="{FF2B5EF4-FFF2-40B4-BE49-F238E27FC236}">
-                <a16:creationId xmlns:a16="http://schemas.microsoft.com/office/drawing/2014/main" id="{F0DF7579-6043-AA5F-D4A5-FE436F489BB0}"/>
-              </a:ext>
-            </a:extLst>
-          </p:cNvPr>
-          <p:cNvSpPr>
-            <a:spLocks noGrp="1"/>
-          </p:cNvSpPr>
-          <p:nvPr>
-            <p:ph type="sldNum" sz="quarter" idx="12"/>
-          </p:nvPr>
-        </p:nvSpPr>
-        <p:spPr/>
-        <p:txBody>
-          <a:bodyPr/>
-          <a:lstStyle/>
-          <a:p>
-            <a:fld id="{20AF9D7A-5BEE-9245-944A-197F51D542D9}" type="slidenum">
-              <a:rPr lang="en-US" smtClean="0"/>
-              <a:t>8</a:t>
-            </a:fld>
-            <a:endParaRPr lang="en-US"/>
-          </a:p>
-        </p:txBody>
-      </p:sp>
-    </p:spTree>
-    <p:extLst>
-      <p:ext uri="{BB962C8B-B14F-4D97-AF65-F5344CB8AC3E}">
-        <p14:creationId xmlns:p14="http://schemas.microsoft.com/office/powerpoint/2010/main" val="1439505580"/>
-      </p:ext>
-    </p:extLst>
-  </p:cSld>
-  <p:clrMapOvr>
-    <a:masterClrMapping/>
-  </p:clrMapOvr>
-</p:sld>
-</file>
-
-<file path=ppt/slides/slide9.xml><?xml version="1.0" encoding="utf-8"?>
-<p:sld xmlns:a="http://schemas.openxmlformats.org/drawingml/2006/main" xmlns:r="http://schemas.openxmlformats.org/officeDocument/2006/relationships" xmlns:p="http://schemas.openxmlformats.org/presentationml/2006/main">
-  <p:cSld>
-    <p:spTree>
-      <p:nvGrpSpPr>
-        <p:cNvPr id="1" name=""/>
-        <p:cNvGrpSpPr/>
-        <p:nvPr/>
-      </p:nvGrpSpPr>
-      <p:grpSpPr>
-        <a:xfrm>
-          <a:off x="0" y="0"/>
-          <a:ext cx="0" cy="0"/>
-          <a:chOff x="0" y="0"/>
-          <a:chExt cx="0" cy="0"/>
-        </a:xfrm>
-      </p:grpSpPr>
-      <p:sp>
-        <p:nvSpPr>
-          <p:cNvPr id="2" name="Title 1">
-            <a:extLst>
-              <a:ext uri="{FF2B5EF4-FFF2-40B4-BE49-F238E27FC236}">
-                <a16:creationId xmlns:a16="http://schemas.microsoft.com/office/drawing/2014/main" id="{68E393EF-C4FC-7C5D-3EBE-FD83BA9D894B}"/>
-              </a:ext>
-            </a:extLst>
-          </p:cNvPr>
-          <p:cNvSpPr>
-            <a:spLocks noGrp="1"/>
-          </p:cNvSpPr>
-          <p:nvPr>
-            <p:ph type="title"/>
-          </p:nvPr>
-        </p:nvSpPr>
-        <p:spPr/>
-        <p:txBody>
-          <a:bodyPr>
-            <a:normAutofit fontScale="90000"/>
-          </a:bodyPr>
-          <a:lstStyle/>
-          <a:p>
-            <a:r>
-              <a:rPr lang="en-US" dirty="0"/>
-              <a:t>Let’s Walk Through an Example: Expanding on Roles after the POC</a:t>
-            </a:r>
-          </a:p>
-        </p:txBody>
-      </p:sp>
-      <p:sp>
-        <p:nvSpPr>
-          <p:cNvPr id="3" name="Content Placeholder 2">
-            <a:extLst>
-              <a:ext uri="{FF2B5EF4-FFF2-40B4-BE49-F238E27FC236}">
-                <a16:creationId xmlns:a16="http://schemas.microsoft.com/office/drawing/2014/main" id="{82A11BD5-889A-009B-2F6E-C1E5CB86E500}"/>
-              </a:ext>
-            </a:extLst>
-          </p:cNvPr>
-          <p:cNvSpPr>
-            <a:spLocks noGrp="1"/>
-          </p:cNvSpPr>
-          <p:nvPr>
-            <p:ph idx="1"/>
-          </p:nvPr>
-        </p:nvSpPr>
-        <p:spPr/>
-        <p:txBody>
-          <a:bodyPr>
-            <a:normAutofit/>
-          </a:bodyPr>
-          <a:lstStyle/>
-          <a:p>
-            <a:pPr marL="0" marR="0" lvl="0" indent="0">
-              <a:lnSpc>
-                <a:spcPct val="100000"/>
-              </a:lnSpc>
-              <a:spcBef>
-                <a:spcPts val="0"/>
-              </a:spcBef>
-              <a:spcAft>
-                <a:spcPts val="600"/>
-              </a:spcAft>
-              <a:buNone/>
-            </a:pPr>
-            <a:r>
-              <a:rPr lang="en-US" sz="3200" dirty="0">
-                <a:solidFill>
-                  <a:srgbClr val="4472C4"/>
-                </a:solidFill>
-                <a:effectLst/>
-                <a:ea typeface="Calibri" panose="020F0502020204030204" pitchFamily="34" charset="0"/>
-                <a:cs typeface="Calibri" panose="020F0502020204030204" pitchFamily="34" charset="0"/>
-              </a:rPr>
-              <a:t>Scheme Manager and Payment Hub Operator may be the same or different Entities. This needs to be defined for each Scheme:</a:t>
-            </a:r>
-          </a:p>
-          <a:p>
-            <a:pPr marL="0" marR="0" lvl="0" indent="0">
-              <a:lnSpc>
-                <a:spcPct val="100000"/>
-              </a:lnSpc>
-              <a:spcBef>
-                <a:spcPts val="0"/>
-              </a:spcBef>
-              <a:spcAft>
-                <a:spcPts val="600"/>
-              </a:spcAft>
-              <a:buNone/>
-            </a:pPr>
-            <a:r>
-              <a:rPr lang="en-US" sz="3200" dirty="0">
-                <a:solidFill>
-                  <a:srgbClr val="4472C4"/>
-                </a:solidFill>
-                <a:effectLst/>
-                <a:ea typeface="Calibri" panose="020F0502020204030204" pitchFamily="34" charset="0"/>
-                <a:cs typeface="Calibri" panose="020F0502020204030204" pitchFamily="34" charset="0"/>
-              </a:rPr>
-              <a:t> </a:t>
-            </a:r>
-            <a:endParaRPr lang="en-US" sz="3200" dirty="0">
-              <a:effectLst/>
-              <a:ea typeface="Calibri" panose="020F0502020204030204" pitchFamily="34" charset="0"/>
-              <a:cs typeface="Times New Roman" panose="02020603050405020304" pitchFamily="18" charset="0"/>
-            </a:endParaRPr>
-          </a:p>
-          <a:p>
-            <a:pPr marL="342900" marR="0" lvl="0" indent="-342900">
-              <a:lnSpc>
-                <a:spcPct val="100000"/>
-              </a:lnSpc>
-              <a:spcBef>
-                <a:spcPts val="0"/>
-              </a:spcBef>
-              <a:spcAft>
-                <a:spcPts val="600"/>
-              </a:spcAft>
-              <a:buFont typeface="Symbol" pitchFamily="2" charset="2"/>
-              <a:buChar char=""/>
-            </a:pPr>
-            <a:r>
-              <a:rPr lang="en-US" sz="3200" b="1" dirty="0">
-                <a:solidFill>
-                  <a:srgbClr val="4472C4"/>
-                </a:solidFill>
-                <a:effectLst/>
-                <a:ea typeface="Calibri" panose="020F0502020204030204" pitchFamily="34" charset="0"/>
-                <a:cs typeface="Calibri" panose="020F0502020204030204" pitchFamily="34" charset="0"/>
-              </a:rPr>
-              <a:t>Different Types of Participants.</a:t>
-            </a:r>
-            <a:r>
-              <a:rPr lang="en-US" sz="3200" dirty="0">
-                <a:solidFill>
-                  <a:srgbClr val="4472C4"/>
-                </a:solidFill>
-                <a:effectLst/>
-                <a:ea typeface="Calibri" panose="020F0502020204030204" pitchFamily="34" charset="0"/>
-                <a:cs typeface="Calibri" panose="020F0502020204030204" pitchFamily="34" charset="0"/>
-              </a:rPr>
-              <a:t> Note that there is no single definition of Participant that applies equally to each Scheme and thus, the definitions provided for the POC may need to be refined or expanded, and other definitions may need to be added. Schemes may define Direct and Indirect Participants differently and may identify other/additional categories of Participants. The definitions included in this Rulebook are based on current understanding of the list of Participants. It is critical that the Scheme is precise in its definitions and in clearly outlining the roles and responsibilities of each type of Participant. </a:t>
-            </a:r>
-            <a:endParaRPr lang="en-US" sz="3200" dirty="0">
-              <a:effectLst/>
-              <a:ea typeface="Calibri" panose="020F0502020204030204" pitchFamily="34" charset="0"/>
-              <a:cs typeface="Times New Roman" panose="02020603050405020304" pitchFamily="18" charset="0"/>
-            </a:endParaRPr>
-          </a:p>
-          <a:p>
-            <a:pPr marL="342900" marR="0" lvl="0" indent="-342900">
-              <a:lnSpc>
-                <a:spcPct val="100000"/>
-              </a:lnSpc>
-              <a:spcBef>
-                <a:spcPts val="0"/>
-              </a:spcBef>
-              <a:spcAft>
-                <a:spcPts val="600"/>
-              </a:spcAft>
-              <a:buFont typeface="Symbol" pitchFamily="2" charset="2"/>
-              <a:buChar char=""/>
-            </a:pPr>
-            <a:r>
-              <a:rPr lang="en-US" sz="3200" b="1" dirty="0">
-                <a:solidFill>
-                  <a:srgbClr val="4472C4"/>
-                </a:solidFill>
-                <a:effectLst/>
-                <a:ea typeface="Calibri" panose="020F0502020204030204" pitchFamily="34" charset="0"/>
-                <a:cs typeface="Calibri" panose="020F0502020204030204" pitchFamily="34" charset="0"/>
-              </a:rPr>
-              <a:t>Technical Service Provider (TSP).</a:t>
-            </a:r>
-            <a:r>
-              <a:rPr lang="en-US" sz="3200" dirty="0">
-                <a:solidFill>
-                  <a:srgbClr val="4472C4"/>
-                </a:solidFill>
-                <a:effectLst/>
-                <a:ea typeface="Calibri" panose="020F0502020204030204" pitchFamily="34" charset="0"/>
-                <a:cs typeface="Calibri" panose="020F0502020204030204" pitchFamily="34" charset="0"/>
-              </a:rPr>
-              <a:t> A Service Provider that provides the technical connection to the Payment Hub for a Participant and may provide other supporting services. A Technical Service Provider is typically required to adhere to the rules defined in the Technical Service Provider Agreement and other relevant SLAs. In addition, there are sometimes rules in the Scheme Rulebook for Technical Service Providers. If you create a TSP role, it is important to note in the Rulebook that reliance on a TSP by a Participant </a:t>
-            </a:r>
-            <a:r>
-              <a:rPr lang="en-US" sz="3200" u="sng" dirty="0">
-                <a:solidFill>
-                  <a:srgbClr val="4472C4"/>
-                </a:solidFill>
-                <a:effectLst/>
-                <a:ea typeface="Calibri" panose="020F0502020204030204" pitchFamily="34" charset="0"/>
-                <a:cs typeface="Calibri" panose="020F0502020204030204" pitchFamily="34" charset="0"/>
-              </a:rPr>
-              <a:t>does not</a:t>
-            </a:r>
-            <a:r>
-              <a:rPr lang="en-US" sz="3200" dirty="0">
-                <a:solidFill>
-                  <a:srgbClr val="4472C4"/>
-                </a:solidFill>
-                <a:effectLst/>
-                <a:ea typeface="Calibri" panose="020F0502020204030204" pitchFamily="34" charset="0"/>
-                <a:cs typeface="Calibri" panose="020F0502020204030204" pitchFamily="34" charset="0"/>
-              </a:rPr>
-              <a:t> relieve the Participant from its full obligations defined in the Rulebook. </a:t>
-            </a:r>
-            <a:endParaRPr lang="en-US" sz="3200" dirty="0">
-              <a:effectLst/>
-              <a:ea typeface="Calibri" panose="020F0502020204030204" pitchFamily="34" charset="0"/>
-              <a:cs typeface="Times New Roman" panose="02020603050405020304" pitchFamily="18" charset="0"/>
-            </a:endParaRPr>
-          </a:p>
-          <a:p>
-            <a:pPr marL="342900" marR="0" lvl="0" indent="-342900">
-              <a:lnSpc>
-                <a:spcPct val="100000"/>
-              </a:lnSpc>
-              <a:spcBef>
-                <a:spcPts val="0"/>
-              </a:spcBef>
-              <a:spcAft>
-                <a:spcPts val="600"/>
-              </a:spcAft>
-              <a:buFont typeface="Symbol" pitchFamily="2" charset="2"/>
-              <a:buChar char=""/>
-            </a:pPr>
-            <a:r>
-              <a:rPr lang="en-US" sz="3200" b="1" dirty="0">
-                <a:solidFill>
-                  <a:srgbClr val="4472C4"/>
-                </a:solidFill>
-                <a:effectLst/>
-                <a:ea typeface="Calibri" panose="020F0502020204030204" pitchFamily="34" charset="0"/>
-                <a:cs typeface="Calibri" panose="020F0502020204030204" pitchFamily="34" charset="0"/>
-              </a:rPr>
-              <a:t>Payment Initiator Service Provider (PISP).</a:t>
-            </a:r>
-            <a:r>
-              <a:rPr lang="en-US" sz="3200" dirty="0">
-                <a:solidFill>
-                  <a:srgbClr val="4472C4"/>
-                </a:solidFill>
-                <a:effectLst/>
-                <a:ea typeface="Calibri" panose="020F0502020204030204" pitchFamily="34" charset="0"/>
-                <a:cs typeface="Calibri" panose="020F0502020204030204" pitchFamily="34" charset="0"/>
-              </a:rPr>
-              <a:t> An Entity that is authorized to connect directly to the Payment Hub for the purposes of sending and receiving messages on behalf of the End User. A Payment Initiator is not a Participant but is bound to rules outlined in the Payment Initiator Agreement. Typically, a Payment Initiator does not provide End User Accounts, but can provide the interface for End Users to initiate a Funds Transfer. </a:t>
-            </a:r>
-            <a:endParaRPr lang="en-US" sz="3200" dirty="0">
-              <a:effectLst/>
-              <a:ea typeface="Calibri" panose="020F0502020204030204" pitchFamily="34" charset="0"/>
-              <a:cs typeface="Times New Roman" panose="02020603050405020304" pitchFamily="18" charset="0"/>
-            </a:endParaRPr>
-          </a:p>
-          <a:p>
-            <a:endParaRPr lang="en-US" sz="7200" dirty="0"/>
-          </a:p>
-        </p:txBody>
-      </p:sp>
-      <p:sp>
-        <p:nvSpPr>
-          <p:cNvPr id="4" name="Slide Number Placeholder 3">
-            <a:extLst>
-              <a:ext uri="{FF2B5EF4-FFF2-40B4-BE49-F238E27FC236}">
-                <a16:creationId xmlns:a16="http://schemas.microsoft.com/office/drawing/2014/main" id="{CF10F134-362C-2B4A-CBC3-26313A2892B3}"/>
-              </a:ext>
-            </a:extLst>
-          </p:cNvPr>
-          <p:cNvSpPr>
-            <a:spLocks noGrp="1"/>
-          </p:cNvSpPr>
-          <p:nvPr>
-            <p:ph type="sldNum" sz="quarter" idx="12"/>
-          </p:nvPr>
-        </p:nvSpPr>
-        <p:spPr/>
-        <p:txBody>
-          <a:bodyPr/>
-          <a:lstStyle/>
-          <a:p>
-            <a:fld id="{20AF9D7A-5BEE-9245-944A-197F51D542D9}" type="slidenum">
-              <a:rPr lang="en-US" smtClean="0"/>
-              <a:t>9</a:t>
-            </a:fld>
-            <a:endParaRPr lang="en-US"/>
-          </a:p>
-        </p:txBody>
-      </p:sp>
-    </p:spTree>
-    <p:extLst>
-      <p:ext uri="{BB962C8B-B14F-4D97-AF65-F5344CB8AC3E}">
-        <p14:creationId xmlns:p14="http://schemas.microsoft.com/office/powerpoint/2010/main" val="2024194945"/>
       </p:ext>
     </p:extLst>
   </p:cSld>

</xml_diff>